<commit_message>
adjust ppt and report
</commit_message>
<xml_diff>
--- a/Report/Presentation1.pptx
+++ b/Report/Presentation1.pptx
@@ -5,7 +5,7 @@
     <p:sldMasterId id="2147483686" r:id="rId1"/>
   </p:sldMasterIdLst>
   <p:notesMasterIdLst>
-    <p:notesMasterId r:id="rId16"/>
+    <p:notesMasterId r:id="rId17"/>
   </p:notesMasterIdLst>
   <p:sldIdLst>
     <p:sldId id="256" r:id="rId2"/>
@@ -17,11 +17,12 @@
     <p:sldId id="261" r:id="rId8"/>
     <p:sldId id="267" r:id="rId9"/>
     <p:sldId id="262" r:id="rId10"/>
-    <p:sldId id="263" r:id="rId11"/>
-    <p:sldId id="264" r:id="rId12"/>
-    <p:sldId id="268" r:id="rId13"/>
-    <p:sldId id="265" r:id="rId14"/>
-    <p:sldId id="269" r:id="rId15"/>
+    <p:sldId id="270" r:id="rId11"/>
+    <p:sldId id="263" r:id="rId12"/>
+    <p:sldId id="264" r:id="rId13"/>
+    <p:sldId id="268" r:id="rId14"/>
+    <p:sldId id="265" r:id="rId15"/>
+    <p:sldId id="269" r:id="rId16"/>
   </p:sldIdLst>
   <p:sldSz cx="12192000" cy="6858000"/>
   <p:notesSz cx="6858000" cy="9144000"/>
@@ -120,15 +121,170 @@
       </a:defRPr>
     </a:lvl9pPr>
   </p:defaultTextStyle>
+  <p:extLst>
+    <p:ext uri="{EFAFB233-063F-42B5-8137-9DF3F51BA10A}">
+      <p15:sldGuideLst xmlns:p15="http://schemas.microsoft.com/office/powerpoint/2012/main"/>
+    </p:ext>
+  </p:extLst>
 </p:presentation>
 </file>
 
 <file path=ppt/revisionInfo.xml><?xml version="1.0" encoding="utf-8"?>
 <p1510:revInfo xmlns:a="http://schemas.openxmlformats.org/drawingml/2006/main" xmlns:r="http://schemas.openxmlformats.org/officeDocument/2006/relationships" xmlns:p1510="http://schemas.microsoft.com/office/powerpoint/2015/10/main">
   <p1510:revLst>
-    <p1510:client id="{A7474021-6510-8745-8101-2958247566BB}" v="151" dt="2025-03-28T04:14:05.956"/>
+    <p1510:client id="{A7474021-6510-8745-8101-2958247566BB}" v="331" dt="2025-03-29T07:29:05.988"/>
   </p1510:revLst>
 </p1510:revInfo>
+</file>
+
+<file path=ppt/changesInfos/changesInfo1.xml><?xml version="1.0" encoding="utf-8"?>
+<pc:chgInfo xmlns:a="http://schemas.openxmlformats.org/drawingml/2006/main" xmlns:r="http://schemas.openxmlformats.org/officeDocument/2006/relationships" xmlns:ac="http://schemas.microsoft.com/office/drawing/2013/main/command" xmlns:pc="http://schemas.microsoft.com/office/powerpoint/2013/main/command">
+  <pc:docChgLst>
+    <pc:chgData name="Wen-Shan Liu" userId="11ce903af9f7a3dd" providerId="LiveId" clId="{A7474021-6510-8745-8101-2958247566BB}"/>
+    <pc:docChg chg="custSel addSld modSld sldOrd">
+      <pc:chgData name="Wen-Shan Liu" userId="11ce903af9f7a3dd" providerId="LiveId" clId="{A7474021-6510-8745-8101-2958247566BB}" dt="2025-03-29T07:29:05.988" v="954" actId="113"/>
+      <pc:docMkLst>
+        <pc:docMk/>
+      </pc:docMkLst>
+      <pc:sldChg chg="modSp mod">
+        <pc:chgData name="Wen-Shan Liu" userId="11ce903af9f7a3dd" providerId="LiveId" clId="{A7474021-6510-8745-8101-2958247566BB}" dt="2025-03-29T07:29:05.988" v="954" actId="113"/>
+        <pc:sldMkLst>
+          <pc:docMk/>
+          <pc:sldMk cId="377392462" sldId="257"/>
+        </pc:sldMkLst>
+        <pc:graphicFrameChg chg="mod modGraphic">
+          <ac:chgData name="Wen-Shan Liu" userId="11ce903af9f7a3dd" providerId="LiveId" clId="{A7474021-6510-8745-8101-2958247566BB}" dt="2025-03-29T07:29:05.988" v="954" actId="113"/>
+          <ac:graphicFrameMkLst>
+            <pc:docMk/>
+            <pc:sldMk cId="377392462" sldId="257"/>
+            <ac:graphicFrameMk id="4" creationId="{AF59DA14-546E-1013-C0A4-1153149D237C}"/>
+          </ac:graphicFrameMkLst>
+        </pc:graphicFrameChg>
+      </pc:sldChg>
+      <pc:sldChg chg="modSp mod ord">
+        <pc:chgData name="Wen-Shan Liu" userId="11ce903af9f7a3dd" providerId="LiveId" clId="{A7474021-6510-8745-8101-2958247566BB}" dt="2025-03-29T06:22:20.685" v="477" actId="20577"/>
+        <pc:sldMkLst>
+          <pc:docMk/>
+          <pc:sldMk cId="1264346611" sldId="259"/>
+        </pc:sldMkLst>
+        <pc:spChg chg="mod">
+          <ac:chgData name="Wen-Shan Liu" userId="11ce903af9f7a3dd" providerId="LiveId" clId="{A7474021-6510-8745-8101-2958247566BB}" dt="2025-03-29T06:12:14.727" v="167" actId="20577"/>
+          <ac:spMkLst>
+            <pc:docMk/>
+            <pc:sldMk cId="1264346611" sldId="259"/>
+            <ac:spMk id="2" creationId="{826E9350-8D90-D448-6178-7037D388DCB7}"/>
+          </ac:spMkLst>
+        </pc:spChg>
+        <pc:spChg chg="mod">
+          <ac:chgData name="Wen-Shan Liu" userId="11ce903af9f7a3dd" providerId="LiveId" clId="{A7474021-6510-8745-8101-2958247566BB}" dt="2025-03-29T06:22:20.685" v="477" actId="20577"/>
+          <ac:spMkLst>
+            <pc:docMk/>
+            <pc:sldMk cId="1264346611" sldId="259"/>
+            <ac:spMk id="7" creationId="{2834AA9D-339C-119D-0FA6-7B05E29976F9}"/>
+          </ac:spMkLst>
+        </pc:spChg>
+      </pc:sldChg>
+      <pc:sldChg chg="ord">
+        <pc:chgData name="Wen-Shan Liu" userId="11ce903af9f7a3dd" providerId="LiveId" clId="{A7474021-6510-8745-8101-2958247566BB}" dt="2025-03-29T05:27:17.747" v="48" actId="20578"/>
+        <pc:sldMkLst>
+          <pc:docMk/>
+          <pc:sldMk cId="579996330" sldId="260"/>
+        </pc:sldMkLst>
+      </pc:sldChg>
+      <pc:sldChg chg="modSp mod">
+        <pc:chgData name="Wen-Shan Liu" userId="11ce903af9f7a3dd" providerId="LiveId" clId="{A7474021-6510-8745-8101-2958247566BB}" dt="2025-03-29T07:17:13.464" v="896" actId="20577"/>
+        <pc:sldMkLst>
+          <pc:docMk/>
+          <pc:sldMk cId="2607113920" sldId="262"/>
+        </pc:sldMkLst>
+        <pc:graphicFrameChg chg="mod modGraphic">
+          <ac:chgData name="Wen-Shan Liu" userId="11ce903af9f7a3dd" providerId="LiveId" clId="{A7474021-6510-8745-8101-2958247566BB}" dt="2025-03-29T07:17:13.464" v="896" actId="20577"/>
+          <ac:graphicFrameMkLst>
+            <pc:docMk/>
+            <pc:sldMk cId="2607113920" sldId="262"/>
+            <ac:graphicFrameMk id="4" creationId="{9A598B00-72A0-D92A-824D-DF69DB867696}"/>
+          </ac:graphicFrameMkLst>
+        </pc:graphicFrameChg>
+      </pc:sldChg>
+      <pc:sldChg chg="modSp mod">
+        <pc:chgData name="Wen-Shan Liu" userId="11ce903af9f7a3dd" providerId="LiveId" clId="{A7474021-6510-8745-8101-2958247566BB}" dt="2025-03-29T07:10:49.898" v="882" actId="20577"/>
+        <pc:sldMkLst>
+          <pc:docMk/>
+          <pc:sldMk cId="3670515408" sldId="264"/>
+        </pc:sldMkLst>
+        <pc:graphicFrameChg chg="modGraphic">
+          <ac:chgData name="Wen-Shan Liu" userId="11ce903af9f7a3dd" providerId="LiveId" clId="{A7474021-6510-8745-8101-2958247566BB}" dt="2025-03-29T07:10:49.898" v="882" actId="20577"/>
+          <ac:graphicFrameMkLst>
+            <pc:docMk/>
+            <pc:sldMk cId="3670515408" sldId="264"/>
+            <ac:graphicFrameMk id="4" creationId="{EF59BFF8-445A-527B-42ED-EE8F22089CF2}"/>
+          </ac:graphicFrameMkLst>
+        </pc:graphicFrameChg>
+      </pc:sldChg>
+      <pc:sldChg chg="modSp">
+        <pc:chgData name="Wen-Shan Liu" userId="11ce903af9f7a3dd" providerId="LiveId" clId="{A7474021-6510-8745-8101-2958247566BB}" dt="2025-03-29T06:57:31.244" v="807" actId="20577"/>
+        <pc:sldMkLst>
+          <pc:docMk/>
+          <pc:sldMk cId="3345724384" sldId="265"/>
+        </pc:sldMkLst>
+        <pc:graphicFrameChg chg="mod">
+          <ac:chgData name="Wen-Shan Liu" userId="11ce903af9f7a3dd" providerId="LiveId" clId="{A7474021-6510-8745-8101-2958247566BB}" dt="2025-03-29T06:57:31.244" v="807" actId="20577"/>
+          <ac:graphicFrameMkLst>
+            <pc:docMk/>
+            <pc:sldMk cId="3345724384" sldId="265"/>
+            <ac:graphicFrameMk id="24" creationId="{C2D8B303-C772-A8DD-8D29-6FC96537076B}"/>
+          </ac:graphicFrameMkLst>
+        </pc:graphicFrameChg>
+      </pc:sldChg>
+      <pc:sldChg chg="addSp modSp mod">
+        <pc:chgData name="Wen-Shan Liu" userId="11ce903af9f7a3dd" providerId="LiveId" clId="{A7474021-6510-8745-8101-2958247566BB}" dt="2025-03-29T07:13:31.245" v="889" actId="14100"/>
+        <pc:sldMkLst>
+          <pc:docMk/>
+          <pc:sldMk cId="428631808" sldId="268"/>
+        </pc:sldMkLst>
+        <pc:spChg chg="add mod">
+          <ac:chgData name="Wen-Shan Liu" userId="11ce903af9f7a3dd" providerId="LiveId" clId="{A7474021-6510-8745-8101-2958247566BB}" dt="2025-03-29T07:13:31.245" v="889" actId="14100"/>
+          <ac:spMkLst>
+            <pc:docMk/>
+            <pc:sldMk cId="428631808" sldId="268"/>
+            <ac:spMk id="3" creationId="{A06B7EAF-3A7E-6CD1-DCAA-F7424177EC7C}"/>
+          </ac:spMkLst>
+        </pc:spChg>
+        <pc:spChg chg="mod">
+          <ac:chgData name="Wen-Shan Liu" userId="11ce903af9f7a3dd" providerId="LiveId" clId="{A7474021-6510-8745-8101-2958247566BB}" dt="2025-03-29T06:54:44.062" v="760" actId="20577"/>
+          <ac:spMkLst>
+            <pc:docMk/>
+            <pc:sldMk cId="428631808" sldId="268"/>
+            <ac:spMk id="18" creationId="{8A3648C9-AC9E-F045-E269-61737F93AE47}"/>
+          </ac:spMkLst>
+        </pc:spChg>
+      </pc:sldChg>
+      <pc:sldChg chg="modSp new mod">
+        <pc:chgData name="Wen-Shan Liu" userId="11ce903af9f7a3dd" providerId="LiveId" clId="{A7474021-6510-8745-8101-2958247566BB}" dt="2025-03-29T07:08:03.115" v="875" actId="12"/>
+        <pc:sldMkLst>
+          <pc:docMk/>
+          <pc:sldMk cId="1304513926" sldId="270"/>
+        </pc:sldMkLst>
+        <pc:spChg chg="mod">
+          <ac:chgData name="Wen-Shan Liu" userId="11ce903af9f7a3dd" providerId="LiveId" clId="{A7474021-6510-8745-8101-2958247566BB}" dt="2025-03-29T06:46:40.790" v="478" actId="20577"/>
+          <ac:spMkLst>
+            <pc:docMk/>
+            <pc:sldMk cId="1304513926" sldId="270"/>
+            <ac:spMk id="2" creationId="{99321B73-51D4-C468-9F86-15EECB9B6118}"/>
+          </ac:spMkLst>
+        </pc:spChg>
+        <pc:spChg chg="mod">
+          <ac:chgData name="Wen-Shan Liu" userId="11ce903af9f7a3dd" providerId="LiveId" clId="{A7474021-6510-8745-8101-2958247566BB}" dt="2025-03-29T07:08:03.115" v="875" actId="12"/>
+          <ac:spMkLst>
+            <pc:docMk/>
+            <pc:sldMk cId="1304513926" sldId="270"/>
+            <ac:spMk id="3" creationId="{011EE8CF-EB87-1112-5C31-507CDCE0DCE1}"/>
+          </ac:spMkLst>
+        </pc:spChg>
+      </pc:sldChg>
+    </pc:docChg>
+  </pc:docChgLst>
+</pc:chgInfo>
 </file>
 
 <file path=ppt/diagrams/colors1.xml><?xml version="1.0" encoding="utf-8"?>
@@ -2659,13 +2815,55 @@
         <a:lstStyle/>
         <a:p>
           <a:r>
-            <a:rPr lang="en-US" sz="1800" b="1" dirty="0">
+            <a:rPr lang="en-US" sz="1600" b="1" dirty="0">
               <a:latin typeface="Arial" panose="020B0604020202020204" pitchFamily="34" charset="0"/>
               <a:cs typeface="Arial" panose="020B0604020202020204" pitchFamily="34" charset="0"/>
             </a:rPr>
-            <a:t>Data Sources &amp; Preprocessing </a:t>
+            <a:t>Data</a:t>
           </a:r>
-          <a:endParaRPr lang="en-US" sz="1800" dirty="0">
+          <a:r>
+            <a:rPr lang="zh-TW" altLang="en-US" sz="1600" b="1" dirty="0">
+              <a:latin typeface="Arial" panose="020B0604020202020204" pitchFamily="34" charset="0"/>
+              <a:cs typeface="Arial" panose="020B0604020202020204" pitchFamily="34" charset="0"/>
+            </a:rPr>
+            <a:t> </a:t>
+          </a:r>
+          <a:r>
+            <a:rPr lang="en-US" altLang="zh-TW" sz="1600" b="1" dirty="0">
+              <a:latin typeface="Arial" panose="020B0604020202020204" pitchFamily="34" charset="0"/>
+              <a:cs typeface="Arial" panose="020B0604020202020204" pitchFamily="34" charset="0"/>
+            </a:rPr>
+            <a:t>Wrangling</a:t>
+          </a:r>
+          <a:r>
+            <a:rPr lang="zh-TW" altLang="en-US" sz="1600" b="1" dirty="0">
+              <a:latin typeface="Arial" panose="020B0604020202020204" pitchFamily="34" charset="0"/>
+              <a:cs typeface="Arial" panose="020B0604020202020204" pitchFamily="34" charset="0"/>
+            </a:rPr>
+            <a:t> </a:t>
+          </a:r>
+          <a:r>
+            <a:rPr lang="en-US" altLang="zh-TW" sz="1600" b="1" dirty="0">
+              <a:latin typeface="Arial" panose="020B0604020202020204" pitchFamily="34" charset="0"/>
+              <a:cs typeface="Arial" panose="020B0604020202020204" pitchFamily="34" charset="0"/>
+            </a:rPr>
+            <a:t>&amp;</a:t>
+          </a:r>
+          <a:r>
+            <a:rPr lang="zh-TW" altLang="en-US" sz="1600" b="1" dirty="0">
+              <a:latin typeface="Arial" panose="020B0604020202020204" pitchFamily="34" charset="0"/>
+              <a:cs typeface="Arial" panose="020B0604020202020204" pitchFamily="34" charset="0"/>
+            </a:rPr>
+            <a:t> </a:t>
+          </a:r>
+          <a:r>
+            <a:rPr lang="en-US" altLang="zh-TW" sz="1600" b="1" dirty="0">
+              <a:latin typeface="Arial" panose="020B0604020202020204" pitchFamily="34" charset="0"/>
+              <a:cs typeface="Arial" panose="020B0604020202020204" pitchFamily="34" charset="0"/>
+            </a:rPr>
+            <a:t>EDA</a:t>
+          </a:r>
+          <a:endParaRPr lang="en-US" sz="1600" dirty="0">
             <a:latin typeface="Arial" panose="020B0604020202020204" pitchFamily="34" charset="0"/>
             <a:cs typeface="Arial" panose="020B0604020202020204" pitchFamily="34" charset="0"/>
           </a:endParaRPr>
@@ -2712,8 +2910,19 @@
               <a:latin typeface="Arial" panose="020B0604020202020204" pitchFamily="34" charset="0"/>
               <a:cs typeface="Arial" panose="020B0604020202020204" pitchFamily="34" charset="0"/>
             </a:rPr>
-            <a:t>Data Cleaning &amp; Preprocessing </a:t>
+            <a:t>Data </a:t>
           </a:r>
+          <a:r>
+            <a:rPr lang="en-US" altLang="zh-TW" sz="1600" dirty="0">
+              <a:latin typeface="Arial" panose="020B0604020202020204" pitchFamily="34" charset="0"/>
+              <a:cs typeface="Arial" panose="020B0604020202020204" pitchFamily="34" charset="0"/>
+            </a:rPr>
+            <a:t>Wrangling</a:t>
+          </a:r>
+          <a:endParaRPr lang="en-US" sz="1600" dirty="0">
+            <a:latin typeface="Arial" panose="020B0604020202020204" pitchFamily="34" charset="0"/>
+            <a:cs typeface="Arial" panose="020B0604020202020204" pitchFamily="34" charset="0"/>
+          </a:endParaRPr>
         </a:p>
       </dgm:t>
     </dgm:pt>
@@ -2798,13 +3007,13 @@
         <a:lstStyle/>
         <a:p>
           <a:r>
-            <a:rPr lang="en-US" sz="1800" b="1" dirty="0">
+            <a:rPr lang="en-US" sz="1600" b="1" dirty="0">
               <a:latin typeface="Arial" panose="020B0604020202020204" pitchFamily="34" charset="0"/>
               <a:cs typeface="Arial" panose="020B0604020202020204" pitchFamily="34" charset="0"/>
             </a:rPr>
-            <a:t>Machine Learning Methodology </a:t>
+            <a:t>Machine Learning Methodology</a:t>
           </a:r>
-          <a:endParaRPr lang="en-US" sz="1800" dirty="0">
+          <a:endParaRPr lang="en-US" sz="1600" dirty="0">
             <a:latin typeface="Arial" panose="020B0604020202020204" pitchFamily="34" charset="0"/>
             <a:cs typeface="Arial" panose="020B0604020202020204" pitchFamily="34" charset="0"/>
           </a:endParaRPr>
@@ -3203,129 +3412,154 @@
         </a:p>
       </dgm:t>
     </dgm:pt>
-    <dgm:pt modelId="{3A2F2DA7-C19D-0845-9924-C43BA9A2D134}">
-      <dgm:prSet phldrT="[Text]" custT="1"/>
+    <dgm:pt modelId="{762F851C-ADB4-A646-B56F-9C0AD7973CFE}">
+      <dgm:prSet phldrT="[Text]"/>
       <dgm:spPr/>
       <dgm:t>
         <a:bodyPr/>
         <a:lstStyle/>
         <a:p>
-          <a:endParaRPr lang="en-US" sz="1600" dirty="0">
+          <a:r>
+            <a:rPr lang="en-US" altLang="zh-TW" b="1" dirty="0">
+              <a:latin typeface="Arial" panose="020B0604020202020204" pitchFamily="34" charset="0"/>
+              <a:cs typeface="Arial" panose="020B0604020202020204" pitchFamily="34" charset="0"/>
+            </a:rPr>
+            <a:t>Pre</a:t>
+          </a:r>
+          <a:r>
+            <a:rPr lang="en-US" b="1" dirty="0">
+              <a:latin typeface="Arial" panose="020B0604020202020204" pitchFamily="34" charset="0"/>
+              <a:cs typeface="Arial" panose="020B0604020202020204" pitchFamily="34" charset="0"/>
+            </a:rPr>
+            <a:t>processing </a:t>
+          </a:r>
+          <a:endParaRPr lang="en-US" dirty="0">
             <a:latin typeface="Arial" panose="020B0604020202020204" pitchFamily="34" charset="0"/>
             <a:cs typeface="Arial" panose="020B0604020202020204" pitchFamily="34" charset="0"/>
           </a:endParaRPr>
         </a:p>
       </dgm:t>
     </dgm:pt>
-    <dgm:pt modelId="{562EDEAB-CDCF-A541-BFF6-3CDE6B48C7AD}" type="parTrans" cxnId="{AB807C70-FBC0-174C-B141-8175CA808726}">
+    <dgm:pt modelId="{AD559AA1-FD29-CD49-BC20-7CBE2290BB09}" type="parTrans" cxnId="{2FE72079-C85B-A24B-A6AF-DDBED6AF128E}">
       <dgm:prSet/>
       <dgm:spPr/>
       <dgm:t>
         <a:bodyPr/>
         <a:lstStyle/>
         <a:p>
-          <a:endParaRPr lang="en-US" sz="1800">
+          <a:endParaRPr lang="en-US"/>
+        </a:p>
+      </dgm:t>
+    </dgm:pt>
+    <dgm:pt modelId="{A17A4CBA-6BE2-7542-B832-C8D04BBD0079}" type="sibTrans" cxnId="{2FE72079-C85B-A24B-A6AF-DDBED6AF128E}">
+      <dgm:prSet/>
+      <dgm:spPr/>
+      <dgm:t>
+        <a:bodyPr/>
+        <a:lstStyle/>
+        <a:p>
+          <a:endParaRPr lang="en-US"/>
+        </a:p>
+      </dgm:t>
+    </dgm:pt>
+    <dgm:pt modelId="{08A6271A-A8A7-DA46-9F51-9372D5814AC3}">
+      <dgm:prSet phldrT="[Text]"/>
+      <dgm:spPr/>
+      <dgm:t>
+        <a:bodyPr/>
+        <a:lstStyle/>
+        <a:p>
+          <a:r>
+            <a:rPr lang="en-US" b="0" dirty="0">
+              <a:effectLst/>
+              <a:latin typeface="Arial" panose="020B0604020202020204" pitchFamily="34" charset="0"/>
+              <a:cs typeface="Arial" panose="020B0604020202020204" pitchFamily="34" charset="0"/>
+            </a:rPr>
+            <a:t>Feature Scaling </a:t>
+          </a:r>
+          <a:endParaRPr lang="en-US" b="0" dirty="0">
             <a:latin typeface="Arial" panose="020B0604020202020204" pitchFamily="34" charset="0"/>
             <a:cs typeface="Arial" panose="020B0604020202020204" pitchFamily="34" charset="0"/>
           </a:endParaRPr>
         </a:p>
       </dgm:t>
     </dgm:pt>
-    <dgm:pt modelId="{43A9FDC8-2B60-3F40-968A-F54A764836E8}" type="sibTrans" cxnId="{AB807C70-FBC0-174C-B141-8175CA808726}">
+    <dgm:pt modelId="{6E4BB40D-CCB3-3142-B163-03DB5F3482C4}" type="parTrans" cxnId="{7659DD37-2999-5049-9220-289732287824}">
       <dgm:prSet/>
       <dgm:spPr/>
       <dgm:t>
         <a:bodyPr/>
         <a:lstStyle/>
         <a:p>
-          <a:endParaRPr lang="en-US" sz="1800">
+          <a:endParaRPr lang="en-US"/>
+        </a:p>
+      </dgm:t>
+    </dgm:pt>
+    <dgm:pt modelId="{D2E12D00-4E88-B047-A2C9-164975964558}" type="sibTrans" cxnId="{7659DD37-2999-5049-9220-289732287824}">
+      <dgm:prSet/>
+      <dgm:spPr/>
+      <dgm:t>
+        <a:bodyPr/>
+        <a:lstStyle/>
+        <a:p>
+          <a:endParaRPr lang="en-US"/>
+        </a:p>
+      </dgm:t>
+    </dgm:pt>
+    <dgm:pt modelId="{7FE194D3-3C50-B84E-AEA8-7B176EC10B8A}">
+      <dgm:prSet phldrT="[Text]"/>
+      <dgm:spPr/>
+      <dgm:t>
+        <a:bodyPr/>
+        <a:lstStyle/>
+        <a:p>
+          <a:r>
+            <a:rPr lang="en-US" altLang="zh-TW" b="0" dirty="0">
+              <a:latin typeface="Arial" panose="020B0604020202020204" pitchFamily="34" charset="0"/>
+              <a:cs typeface="Arial" panose="020B0604020202020204" pitchFamily="34" charset="0"/>
+            </a:rPr>
+            <a:t>Split</a:t>
+          </a:r>
+          <a:r>
+            <a:rPr lang="zh-TW" altLang="en-US" b="0" dirty="0">
+              <a:latin typeface="Arial" panose="020B0604020202020204" pitchFamily="34" charset="0"/>
+              <a:cs typeface="Arial" panose="020B0604020202020204" pitchFamily="34" charset="0"/>
+            </a:rPr>
+            <a:t> </a:t>
+          </a:r>
+          <a:r>
+            <a:rPr lang="en-US" altLang="zh-TW" b="0" dirty="0">
+              <a:latin typeface="Arial" panose="020B0604020202020204" pitchFamily="34" charset="0"/>
+              <a:cs typeface="Arial" panose="020B0604020202020204" pitchFamily="34" charset="0"/>
+            </a:rPr>
+            <a:t>dataset</a:t>
+          </a:r>
+          <a:endParaRPr lang="en-US" b="0" dirty="0">
             <a:latin typeface="Arial" panose="020B0604020202020204" pitchFamily="34" charset="0"/>
             <a:cs typeface="Arial" panose="020B0604020202020204" pitchFamily="34" charset="0"/>
           </a:endParaRPr>
         </a:p>
       </dgm:t>
     </dgm:pt>
-    <dgm:pt modelId="{F80325C2-B4D3-D14E-A424-C206D27011FE}">
-      <dgm:prSet phldrT="[Text]" custT="1"/>
-      <dgm:spPr/>
-      <dgm:t>
-        <a:bodyPr/>
-        <a:lstStyle/>
-        <a:p>
-          <a:endParaRPr lang="en-US" sz="1600" dirty="0">
-            <a:latin typeface="Arial" panose="020B0604020202020204" pitchFamily="34" charset="0"/>
-            <a:cs typeface="Arial" panose="020B0604020202020204" pitchFamily="34" charset="0"/>
-          </a:endParaRPr>
-        </a:p>
-      </dgm:t>
-    </dgm:pt>
-    <dgm:pt modelId="{FFAEAA3C-F665-2D49-9B12-78821B5B23F3}" type="parTrans" cxnId="{2EF94788-ECFE-4A4C-A34F-D666D4CE2964}">
+    <dgm:pt modelId="{F0D82CB0-9D5F-3648-BD6A-C1C081B85B9E}" type="parTrans" cxnId="{A7A03529-54E6-C648-9174-3B2E1C9135D3}">
       <dgm:prSet/>
       <dgm:spPr/>
       <dgm:t>
         <a:bodyPr/>
         <a:lstStyle/>
         <a:p>
-          <a:endParaRPr lang="en-US" sz="1800">
-            <a:latin typeface="Arial" panose="020B0604020202020204" pitchFamily="34" charset="0"/>
-            <a:cs typeface="Arial" panose="020B0604020202020204" pitchFamily="34" charset="0"/>
-          </a:endParaRPr>
+          <a:endParaRPr lang="en-US"/>
         </a:p>
       </dgm:t>
     </dgm:pt>
-    <dgm:pt modelId="{B9B9E639-0B3A-AB4E-A7CC-2D2DCB152326}" type="sibTrans" cxnId="{2EF94788-ECFE-4A4C-A34F-D666D4CE2964}">
+    <dgm:pt modelId="{49C780DE-24E2-6D4E-8234-795A22DDEFC6}" type="sibTrans" cxnId="{A7A03529-54E6-C648-9174-3B2E1C9135D3}">
       <dgm:prSet/>
       <dgm:spPr/>
       <dgm:t>
         <a:bodyPr/>
         <a:lstStyle/>
         <a:p>
-          <a:endParaRPr lang="en-US" sz="1800">
-            <a:latin typeface="Arial" panose="020B0604020202020204" pitchFamily="34" charset="0"/>
-            <a:cs typeface="Arial" panose="020B0604020202020204" pitchFamily="34" charset="0"/>
-          </a:endParaRPr>
-        </a:p>
-      </dgm:t>
-    </dgm:pt>
-    <dgm:pt modelId="{BA24F818-17BF-D143-AFC3-44E6F104B10B}">
-      <dgm:prSet phldrT="[Text]" custT="1"/>
-      <dgm:spPr/>
-      <dgm:t>
-        <a:bodyPr/>
-        <a:lstStyle/>
-        <a:p>
-          <a:endParaRPr lang="en-US" sz="1600" dirty="0">
-            <a:latin typeface="Arial" panose="020B0604020202020204" pitchFamily="34" charset="0"/>
-            <a:cs typeface="Arial" panose="020B0604020202020204" pitchFamily="34" charset="0"/>
-          </a:endParaRPr>
-        </a:p>
-      </dgm:t>
-    </dgm:pt>
-    <dgm:pt modelId="{8ECD4114-4EEB-1144-ACCC-2F974ADCCFCB}" type="parTrans" cxnId="{47D4038E-127E-E84D-910A-676D3F041205}">
-      <dgm:prSet/>
-      <dgm:spPr/>
-      <dgm:t>
-        <a:bodyPr/>
-        <a:lstStyle/>
-        <a:p>
-          <a:endParaRPr lang="en-US" sz="1800">
-            <a:latin typeface="Arial" panose="020B0604020202020204" pitchFamily="34" charset="0"/>
-            <a:cs typeface="Arial" panose="020B0604020202020204" pitchFamily="34" charset="0"/>
-          </a:endParaRPr>
-        </a:p>
-      </dgm:t>
-    </dgm:pt>
-    <dgm:pt modelId="{21B2087C-547F-3A45-8E54-94E7E7B5B3AB}" type="sibTrans" cxnId="{47D4038E-127E-E84D-910A-676D3F041205}">
-      <dgm:prSet/>
-      <dgm:spPr/>
-      <dgm:t>
-        <a:bodyPr/>
-        <a:lstStyle/>
-        <a:p>
-          <a:endParaRPr lang="en-US" sz="1800">
-            <a:latin typeface="Arial" panose="020B0604020202020204" pitchFamily="34" charset="0"/>
-            <a:cs typeface="Arial" panose="020B0604020202020204" pitchFamily="34" charset="0"/>
-          </a:endParaRPr>
+          <a:endParaRPr lang="en-US"/>
         </a:p>
       </dgm:t>
     </dgm:pt>
@@ -3344,7 +3578,7 @@
       <dgm:spPr/>
     </dgm:pt>
     <dgm:pt modelId="{9321D16C-D90B-3F4C-8AEA-14CFA7AD3162}" type="pres">
-      <dgm:prSet presAssocID="{381AA2D3-44BD-1B46-894D-0893ECD65549}" presName="parTx" presStyleLbl="node1" presStyleIdx="0" presStyleCnt="4">
+      <dgm:prSet presAssocID="{381AA2D3-44BD-1B46-894D-0893ECD65549}" presName="parTx" presStyleLbl="node1" presStyleIdx="0" presStyleCnt="5">
         <dgm:presLayoutVars>
           <dgm:chMax val="0"/>
           <dgm:chPref val="0"/>
@@ -3354,7 +3588,7 @@
       <dgm:spPr/>
     </dgm:pt>
     <dgm:pt modelId="{5A72A6F0-89A0-7E48-BBBA-5F74AC659B56}" type="pres">
-      <dgm:prSet presAssocID="{381AA2D3-44BD-1B46-894D-0893ECD65549}" presName="desTx" presStyleLbl="revTx" presStyleIdx="0" presStyleCnt="4">
+      <dgm:prSet presAssocID="{381AA2D3-44BD-1B46-894D-0893ECD65549}" presName="desTx" presStyleLbl="revTx" presStyleIdx="0" presStyleCnt="5">
         <dgm:presLayoutVars>
           <dgm:bulletEnabled val="1"/>
         </dgm:presLayoutVars>
@@ -3370,7 +3604,7 @@
       <dgm:spPr/>
     </dgm:pt>
     <dgm:pt modelId="{5299B6EB-752A-6B4F-8E8D-28B319A85EA9}" type="pres">
-      <dgm:prSet presAssocID="{4DE8458E-F535-544D-B9C3-A1CB1BD95C9D}" presName="parTx" presStyleLbl="node1" presStyleIdx="1" presStyleCnt="4">
+      <dgm:prSet presAssocID="{4DE8458E-F535-544D-B9C3-A1CB1BD95C9D}" presName="parTx" presStyleLbl="node1" presStyleIdx="1" presStyleCnt="5">
         <dgm:presLayoutVars>
           <dgm:chMax val="0"/>
           <dgm:chPref val="0"/>
@@ -3380,7 +3614,7 @@
       <dgm:spPr/>
     </dgm:pt>
     <dgm:pt modelId="{BD08625D-7DEF-4847-9205-B20530AAAE2C}" type="pres">
-      <dgm:prSet presAssocID="{4DE8458E-F535-544D-B9C3-A1CB1BD95C9D}" presName="desTx" presStyleLbl="revTx" presStyleIdx="1" presStyleCnt="4">
+      <dgm:prSet presAssocID="{4DE8458E-F535-544D-B9C3-A1CB1BD95C9D}" presName="desTx" presStyleLbl="revTx" presStyleIdx="1" presStyleCnt="5">
         <dgm:presLayoutVars>
           <dgm:bulletEnabled val="1"/>
         </dgm:presLayoutVars>
@@ -3391,12 +3625,38 @@
       <dgm:prSet presAssocID="{5EDF59B2-1492-EF4E-B4E7-A90B72C0879D}" presName="space" presStyleCnt="0"/>
       <dgm:spPr/>
     </dgm:pt>
+    <dgm:pt modelId="{391C6C74-87EC-5245-A91D-19BE10F3CB92}" type="pres">
+      <dgm:prSet presAssocID="{762F851C-ADB4-A646-B56F-9C0AD7973CFE}" presName="composite" presStyleCnt="0"/>
+      <dgm:spPr/>
+    </dgm:pt>
+    <dgm:pt modelId="{9CF50B9B-04BE-9D41-835C-7FF0C04FE2CA}" type="pres">
+      <dgm:prSet presAssocID="{762F851C-ADB4-A646-B56F-9C0AD7973CFE}" presName="parTx" presStyleLbl="node1" presStyleIdx="2" presStyleCnt="5">
+        <dgm:presLayoutVars>
+          <dgm:chMax val="0"/>
+          <dgm:chPref val="0"/>
+          <dgm:bulletEnabled val="1"/>
+        </dgm:presLayoutVars>
+      </dgm:prSet>
+      <dgm:spPr/>
+    </dgm:pt>
+    <dgm:pt modelId="{6A36D75E-E8FB-F742-906A-4F7B0CE39691}" type="pres">
+      <dgm:prSet presAssocID="{762F851C-ADB4-A646-B56F-9C0AD7973CFE}" presName="desTx" presStyleLbl="revTx" presStyleIdx="2" presStyleCnt="5">
+        <dgm:presLayoutVars>
+          <dgm:bulletEnabled val="1"/>
+        </dgm:presLayoutVars>
+      </dgm:prSet>
+      <dgm:spPr/>
+    </dgm:pt>
+    <dgm:pt modelId="{AA8E3DF5-C5E5-5947-B9D9-94FCD857017A}" type="pres">
+      <dgm:prSet presAssocID="{A17A4CBA-6BE2-7542-B832-C8D04BBD0079}" presName="space" presStyleCnt="0"/>
+      <dgm:spPr/>
+    </dgm:pt>
     <dgm:pt modelId="{63B97BC5-4B6C-7F4E-B36A-038518770763}" type="pres">
       <dgm:prSet presAssocID="{751B3546-8381-9143-87EB-06C2F47250E5}" presName="composite" presStyleCnt="0"/>
       <dgm:spPr/>
     </dgm:pt>
     <dgm:pt modelId="{9498FBED-E3EA-9E4F-90F6-4AFA2732FBD4}" type="pres">
-      <dgm:prSet presAssocID="{751B3546-8381-9143-87EB-06C2F47250E5}" presName="parTx" presStyleLbl="node1" presStyleIdx="2" presStyleCnt="4">
+      <dgm:prSet presAssocID="{751B3546-8381-9143-87EB-06C2F47250E5}" presName="parTx" presStyleLbl="node1" presStyleIdx="3" presStyleCnt="5">
         <dgm:presLayoutVars>
           <dgm:chMax val="0"/>
           <dgm:chPref val="0"/>
@@ -3406,7 +3666,7 @@
       <dgm:spPr/>
     </dgm:pt>
     <dgm:pt modelId="{A99B9945-4767-B64F-90CB-D27764DB7C2B}" type="pres">
-      <dgm:prSet presAssocID="{751B3546-8381-9143-87EB-06C2F47250E5}" presName="desTx" presStyleLbl="revTx" presStyleIdx="2" presStyleCnt="4">
+      <dgm:prSet presAssocID="{751B3546-8381-9143-87EB-06C2F47250E5}" presName="desTx" presStyleLbl="revTx" presStyleIdx="3" presStyleCnt="5">
         <dgm:presLayoutVars>
           <dgm:bulletEnabled val="1"/>
         </dgm:presLayoutVars>
@@ -3422,7 +3682,7 @@
       <dgm:spPr/>
     </dgm:pt>
     <dgm:pt modelId="{4200114D-2D93-9441-B072-EE60824864AF}" type="pres">
-      <dgm:prSet presAssocID="{E85E46D8-FE2F-5E4C-8A2D-7E4250A81379}" presName="parTx" presStyleLbl="node1" presStyleIdx="3" presStyleCnt="4">
+      <dgm:prSet presAssocID="{E85E46D8-FE2F-5E4C-8A2D-7E4250A81379}" presName="parTx" presStyleLbl="node1" presStyleIdx="4" presStyleCnt="5">
         <dgm:presLayoutVars>
           <dgm:chMax val="0"/>
           <dgm:chPref val="0"/>
@@ -3432,7 +3692,7 @@
       <dgm:spPr/>
     </dgm:pt>
     <dgm:pt modelId="{E76A3CE6-F72D-F144-9AC6-11F7149C22BB}" type="pres">
-      <dgm:prSet presAssocID="{E85E46D8-FE2F-5E4C-8A2D-7E4250A81379}" presName="desTx" presStyleLbl="revTx" presStyleIdx="3" presStyleCnt="4">
+      <dgm:prSet presAssocID="{E85E46D8-FE2F-5E4C-8A2D-7E4250A81379}" presName="desTx" presStyleLbl="revTx" presStyleIdx="4" presStyleCnt="5">
         <dgm:presLayoutVars>
           <dgm:bulletEnabled val="1"/>
         </dgm:presLayoutVars>
@@ -3443,35 +3703,35 @@
   <dgm:cxnLst>
     <dgm:cxn modelId="{DCF75801-00A9-CA4E-8B96-C24EEBB3D83A}" type="presOf" srcId="{6F88D72F-3463-C54C-8242-96F49935CFF8}" destId="{5A72A6F0-89A0-7E48-BBBA-5F74AC659B56}" srcOrd="0" destOrd="0" presId="urn:microsoft.com/office/officeart/2005/8/layout/chevron1"/>
     <dgm:cxn modelId="{C04FE803-D20C-FE40-9CBE-9B65FE1679D9}" srcId="{E85E46D8-FE2F-5E4C-8A2D-7E4250A81379}" destId="{4DFA7AF1-CD8E-764A-8BAA-E6D9B63CBF5C}" srcOrd="1" destOrd="0" parTransId="{E2010DC4-E8C0-D840-A634-FBBDDDB30597}" sibTransId="{38F261EA-9E4B-934C-ACAC-704CEEF35B38}"/>
-    <dgm:cxn modelId="{89E9E110-2B46-C940-84F2-4EE95A4E49A6}" srcId="{4DE8458E-F535-544D-B9C3-A1CB1BD95C9D}" destId="{A6EB542B-3537-7E48-8BA4-1410C0628741}" srcOrd="4" destOrd="0" parTransId="{26BA6A5A-1395-3441-A398-E586203CFCE5}" sibTransId="{36C581EB-48DE-F34C-A609-112941417B2D}"/>
+    <dgm:cxn modelId="{89E9E110-2B46-C940-84F2-4EE95A4E49A6}" srcId="{4DE8458E-F535-544D-B9C3-A1CB1BD95C9D}" destId="{A6EB542B-3537-7E48-8BA4-1410C0628741}" srcOrd="2" destOrd="0" parTransId="{26BA6A5A-1395-3441-A398-E586203CFCE5}" sibTransId="{36C581EB-48DE-F34C-A609-112941417B2D}"/>
+    <dgm:cxn modelId="{BE728E16-539F-D844-BFA8-332EE66EB570}" type="presOf" srcId="{762F851C-ADB4-A646-B56F-9C0AD7973CFE}" destId="{9CF50B9B-04BE-9D41-835C-7FF0C04FE2CA}" srcOrd="0" destOrd="0" presId="urn:microsoft.com/office/officeart/2005/8/layout/chevron1"/>
     <dgm:cxn modelId="{7082BC1E-9558-764C-A87F-981DE26A2962}" type="presOf" srcId="{381AA2D3-44BD-1B46-894D-0893ECD65549}" destId="{9321D16C-D90B-3F4C-8AEA-14CFA7AD3162}" srcOrd="0" destOrd="0" presId="urn:microsoft.com/office/officeart/2005/8/layout/chevron1"/>
-    <dgm:cxn modelId="{9FA84624-892C-EC4D-A9B9-5D474720217A}" type="presOf" srcId="{A6EB542B-3537-7E48-8BA4-1410C0628741}" destId="{BD08625D-7DEF-4847-9205-B20530AAAE2C}" srcOrd="0" destOrd="4" presId="urn:microsoft.com/office/officeart/2005/8/layout/chevron1"/>
+    <dgm:cxn modelId="{9FA84624-892C-EC4D-A9B9-5D474720217A}" type="presOf" srcId="{A6EB542B-3537-7E48-8BA4-1410C0628741}" destId="{BD08625D-7DEF-4847-9205-B20530AAAE2C}" srcOrd="0" destOrd="2" presId="urn:microsoft.com/office/officeart/2005/8/layout/chevron1"/>
     <dgm:cxn modelId="{3A9FF928-08F7-0E42-A0AB-D43C118DF99F}" srcId="{4DE8458E-F535-544D-B9C3-A1CB1BD95C9D}" destId="{D7A0C114-3F0F-1F48-8BE6-AB40111DD83D}" srcOrd="0" destOrd="0" parTransId="{55B50794-CAA8-E047-9A64-9E7E03D3898B}" sibTransId="{9A8FBD15-3D8D-2B46-95FD-BD8D24232941}"/>
+    <dgm:cxn modelId="{A7A03529-54E6-C648-9174-3B2E1C9135D3}" srcId="{762F851C-ADB4-A646-B56F-9C0AD7973CFE}" destId="{7FE194D3-3C50-B84E-AEA8-7B176EC10B8A}" srcOrd="1" destOrd="0" parTransId="{F0D82CB0-9D5F-3648-BD6A-C1C081B85B9E}" sibTransId="{49C780DE-24E2-6D4E-8234-795A22DDEFC6}"/>
     <dgm:cxn modelId="{4FAA7730-ECAC-4E4D-8F1B-403A958D3E6D}" type="presOf" srcId="{EF35B85E-C2C0-AE48-8E0E-D1B255B15364}" destId="{E76A3CE6-F72D-F144-9AC6-11F7149C22BB}" srcOrd="0" destOrd="0" presId="urn:microsoft.com/office/officeart/2005/8/layout/chevron1"/>
-    <dgm:cxn modelId="{88782232-C0BC-9243-BFB8-61752B30A261}" srcId="{4DE8458E-F535-544D-B9C3-A1CB1BD95C9D}" destId="{A1F9BCA7-6211-E94D-8BE1-4E519945C083}" srcOrd="2" destOrd="0" parTransId="{7F4E2BEF-A373-3946-AB49-F5B264073F6B}" sibTransId="{46B1017E-A237-F744-9B94-3117BC043407}"/>
-    <dgm:cxn modelId="{1A63F244-18A3-CA40-BA66-644527C2954C}" type="presOf" srcId="{BA24F818-17BF-D143-AFC3-44E6F104B10B}" destId="{BD08625D-7DEF-4847-9205-B20530AAAE2C}" srcOrd="0" destOrd="5" presId="urn:microsoft.com/office/officeart/2005/8/layout/chevron1"/>
-    <dgm:cxn modelId="{BC16AF4B-0FB0-EF4C-B6F4-E160765A7B80}" srcId="{A818F145-D0CE-174E-9AF5-5524CBE9DE19}" destId="{E85E46D8-FE2F-5E4C-8A2D-7E4250A81379}" srcOrd="3" destOrd="0" parTransId="{C5690271-2C7F-5D48-9BA7-F32C32895706}" sibTransId="{E64E9A24-BF6B-AF4B-A4C9-351CC2E9DCE1}"/>
+    <dgm:cxn modelId="{88782232-C0BC-9243-BFB8-61752B30A261}" srcId="{4DE8458E-F535-544D-B9C3-A1CB1BD95C9D}" destId="{A1F9BCA7-6211-E94D-8BE1-4E519945C083}" srcOrd="1" destOrd="0" parTransId="{7F4E2BEF-A373-3946-AB49-F5B264073F6B}" sibTransId="{46B1017E-A237-F744-9B94-3117BC043407}"/>
+    <dgm:cxn modelId="{7659DD37-2999-5049-9220-289732287824}" srcId="{762F851C-ADB4-A646-B56F-9C0AD7973CFE}" destId="{08A6271A-A8A7-DA46-9F51-9372D5814AC3}" srcOrd="0" destOrd="0" parTransId="{6E4BB40D-CCB3-3142-B163-03DB5F3482C4}" sibTransId="{D2E12D00-4E88-B047-A2C9-164975964558}"/>
+    <dgm:cxn modelId="{BC16AF4B-0FB0-EF4C-B6F4-E160765A7B80}" srcId="{A818F145-D0CE-174E-9AF5-5524CBE9DE19}" destId="{E85E46D8-FE2F-5E4C-8A2D-7E4250A81379}" srcOrd="4" destOrd="0" parTransId="{C5690271-2C7F-5D48-9BA7-F32C32895706}" sibTransId="{E64E9A24-BF6B-AF4B-A4C9-351CC2E9DCE1}"/>
     <dgm:cxn modelId="{A0F0B451-7F51-C648-B769-E66DD10A7D72}" srcId="{751B3546-8381-9143-87EB-06C2F47250E5}" destId="{325327FE-5C06-D54B-A042-E923FBF7209F}" srcOrd="0" destOrd="0" parTransId="{EF816604-1437-0C42-A51F-679FE45FB1D1}" sibTransId="{125F5A72-3ADC-DB43-A5D1-2A069825B888}"/>
     <dgm:cxn modelId="{CA55B45B-EDB9-0F4C-9914-A1B42EB81E7A}" type="presOf" srcId="{32129582-98F9-924A-8E5F-B6EC1E301219}" destId="{A99B9945-4767-B64F-90CB-D27764DB7C2B}" srcOrd="0" destOrd="1" presId="urn:microsoft.com/office/officeart/2005/8/layout/chevron1"/>
     <dgm:cxn modelId="{066A255F-3B95-2746-B643-BCB2BB3DEF63}" type="presOf" srcId="{4DFA7AF1-CD8E-764A-8BAA-E6D9B63CBF5C}" destId="{E76A3CE6-F72D-F144-9AC6-11F7149C22BB}" srcOrd="0" destOrd="1" presId="urn:microsoft.com/office/officeart/2005/8/layout/chevron1"/>
-    <dgm:cxn modelId="{AB807C70-FBC0-174C-B141-8175CA808726}" srcId="{4DE8458E-F535-544D-B9C3-A1CB1BD95C9D}" destId="{3A2F2DA7-C19D-0845-9924-C43BA9A2D134}" srcOrd="1" destOrd="0" parTransId="{562EDEAB-CDCF-A541-BFF6-3CDE6B48C7AD}" sibTransId="{43A9FDC8-2B60-3F40-968A-F54A764836E8}"/>
-    <dgm:cxn modelId="{2EF94788-ECFE-4A4C-A34F-D666D4CE2964}" srcId="{4DE8458E-F535-544D-B9C3-A1CB1BD95C9D}" destId="{F80325C2-B4D3-D14E-A424-C206D27011FE}" srcOrd="3" destOrd="0" parTransId="{FFAEAA3C-F665-2D49-9B12-78821B5B23F3}" sibTransId="{B9B9E639-0B3A-AB4E-A7CC-2D2DCB152326}"/>
-    <dgm:cxn modelId="{47D4038E-127E-E84D-910A-676D3F041205}" srcId="{4DE8458E-F535-544D-B9C3-A1CB1BD95C9D}" destId="{BA24F818-17BF-D143-AFC3-44E6F104B10B}" srcOrd="5" destOrd="0" parTransId="{8ECD4114-4EEB-1144-ACCC-2F974ADCCFCB}" sibTransId="{21B2087C-547F-3A45-8E54-94E7E7B5B3AB}"/>
-    <dgm:cxn modelId="{70C0DE95-7D1C-D849-AC03-7543A369C1FA}" type="presOf" srcId="{F80325C2-B4D3-D14E-A424-C206D27011FE}" destId="{BD08625D-7DEF-4847-9205-B20530AAAE2C}" srcOrd="0" destOrd="3" presId="urn:microsoft.com/office/officeart/2005/8/layout/chevron1"/>
+    <dgm:cxn modelId="{2FE72079-C85B-A24B-A6AF-DDBED6AF128E}" srcId="{A818F145-D0CE-174E-9AF5-5524CBE9DE19}" destId="{762F851C-ADB4-A646-B56F-9C0AD7973CFE}" srcOrd="2" destOrd="0" parTransId="{AD559AA1-FD29-CD49-BC20-7CBE2290BB09}" sibTransId="{A17A4CBA-6BE2-7542-B832-C8D04BBD0079}"/>
+    <dgm:cxn modelId="{7F772E7E-383F-FF43-9224-7541B3119443}" type="presOf" srcId="{7FE194D3-3C50-B84E-AEA8-7B176EC10B8A}" destId="{6A36D75E-E8FB-F742-906A-4F7B0CE39691}" srcOrd="0" destOrd="1" presId="urn:microsoft.com/office/officeart/2005/8/layout/chevron1"/>
     <dgm:cxn modelId="{F1435AA0-3E28-584B-B964-4D66323E035E}" srcId="{751B3546-8381-9143-87EB-06C2F47250E5}" destId="{32129582-98F9-924A-8E5F-B6EC1E301219}" srcOrd="1" destOrd="0" parTransId="{6CD831C7-BB79-A040-A1B1-7B063EE42946}" sibTransId="{45CCF67A-C301-DD45-AF94-2FE8E4CA0558}"/>
     <dgm:cxn modelId="{5D6FFCA1-6B12-E94F-AD12-264CA1E26CBC}" type="presOf" srcId="{C68346DA-406F-8546-B08C-6571EFFC8C0D}" destId="{A99B9945-4767-B64F-90CB-D27764DB7C2B}" srcOrd="0" destOrd="2" presId="urn:microsoft.com/office/officeart/2005/8/layout/chevron1"/>
     <dgm:cxn modelId="{90D8A0A3-1E5B-FA49-80EC-6EE3A011D43B}" srcId="{751B3546-8381-9143-87EB-06C2F47250E5}" destId="{C68346DA-406F-8546-B08C-6571EFFC8C0D}" srcOrd="2" destOrd="0" parTransId="{141C3E32-B863-574C-9E2D-5008D03CE0F8}" sibTransId="{7D682D7A-E480-E647-AB3D-2A95D7386595}"/>
     <dgm:cxn modelId="{EDE3D8AC-EAE6-AD47-9868-04C37251E00C}" srcId="{381AA2D3-44BD-1B46-894D-0893ECD65549}" destId="{6F88D72F-3463-C54C-8242-96F49935CFF8}" srcOrd="0" destOrd="0" parTransId="{F81461C5-31EB-514E-8582-B05EA90213CF}" sibTransId="{0BE27761-6F0C-D848-AB72-E864D0E788A7}"/>
-    <dgm:cxn modelId="{1A8600B0-961F-9849-9F31-1A9B87C20BA9}" type="presOf" srcId="{3A2F2DA7-C19D-0845-9924-C43BA9A2D134}" destId="{BD08625D-7DEF-4847-9205-B20530AAAE2C}" srcOrd="0" destOrd="1" presId="urn:microsoft.com/office/officeart/2005/8/layout/chevron1"/>
+    <dgm:cxn modelId="{D22130AD-526F-6141-83E2-BD086AB539D9}" type="presOf" srcId="{08A6271A-A8A7-DA46-9F51-9372D5814AC3}" destId="{6A36D75E-E8FB-F742-906A-4F7B0CE39691}" srcOrd="0" destOrd="0" presId="urn:microsoft.com/office/officeart/2005/8/layout/chevron1"/>
     <dgm:cxn modelId="{299BCBB2-0099-CA41-A6A5-DC6633BFCA2D}" type="presOf" srcId="{4DE8458E-F535-544D-B9C3-A1CB1BD95C9D}" destId="{5299B6EB-752A-6B4F-8E8D-28B319A85EA9}" srcOrd="0" destOrd="0" presId="urn:microsoft.com/office/officeart/2005/8/layout/chevron1"/>
-    <dgm:cxn modelId="{2FEB12B8-F8EA-E444-9E79-0D71D88BF9D3}" type="presOf" srcId="{A1F9BCA7-6211-E94D-8BE1-4E519945C083}" destId="{BD08625D-7DEF-4847-9205-B20530AAAE2C}" srcOrd="0" destOrd="2" presId="urn:microsoft.com/office/officeart/2005/8/layout/chevron1"/>
+    <dgm:cxn modelId="{2FEB12B8-F8EA-E444-9E79-0D71D88BF9D3}" type="presOf" srcId="{A1F9BCA7-6211-E94D-8BE1-4E519945C083}" destId="{BD08625D-7DEF-4847-9205-B20530AAAE2C}" srcOrd="0" destOrd="1" presId="urn:microsoft.com/office/officeart/2005/8/layout/chevron1"/>
     <dgm:cxn modelId="{4FF26FC1-1BF4-E643-9147-346C70DBD9E4}" type="presOf" srcId="{A818F145-D0CE-174E-9AF5-5524CBE9DE19}" destId="{57F4CB9C-B404-9E49-B79C-DCBB8C9808A9}" srcOrd="0" destOrd="0" presId="urn:microsoft.com/office/officeart/2005/8/layout/chevron1"/>
     <dgm:cxn modelId="{B80246C8-A508-5D4D-BFCE-6A151F8FF551}" srcId="{A818F145-D0CE-174E-9AF5-5524CBE9DE19}" destId="{4DE8458E-F535-544D-B9C3-A1CB1BD95C9D}" srcOrd="1" destOrd="0" parTransId="{2E2155EA-A850-924E-91F2-B6AF2BA82443}" sibTransId="{5EDF59B2-1492-EF4E-B4E7-A90B72C0879D}"/>
     <dgm:cxn modelId="{2AB3DCC8-D589-B14F-85D3-B40F8D02B1C8}" type="presOf" srcId="{751B3546-8381-9143-87EB-06C2F47250E5}" destId="{9498FBED-E3EA-9E4F-90F6-4AFA2732FBD4}" srcOrd="0" destOrd="0" presId="urn:microsoft.com/office/officeart/2005/8/layout/chevron1"/>
-    <dgm:cxn modelId="{45DA71D7-A5B2-A843-BCB5-34255D8B44E4}" type="presOf" srcId="{49C8E2D7-9E77-414C-8DC6-4B0333718F0C}" destId="{BD08625D-7DEF-4847-9205-B20530AAAE2C}" srcOrd="0" destOrd="6" presId="urn:microsoft.com/office/officeart/2005/8/layout/chevron1"/>
-    <dgm:cxn modelId="{489624DC-680D-4D43-9130-B56D34E57F4D}" srcId="{4DE8458E-F535-544D-B9C3-A1CB1BD95C9D}" destId="{49C8E2D7-9E77-414C-8DC6-4B0333718F0C}" srcOrd="6" destOrd="0" parTransId="{75077C44-56B3-B348-9A8E-09CF872B2EB2}" sibTransId="{270C29A8-92CD-B541-BDD3-F69EDC946FC7}"/>
+    <dgm:cxn modelId="{45DA71D7-A5B2-A843-BCB5-34255D8B44E4}" type="presOf" srcId="{49C8E2D7-9E77-414C-8DC6-4B0333718F0C}" destId="{BD08625D-7DEF-4847-9205-B20530AAAE2C}" srcOrd="0" destOrd="3" presId="urn:microsoft.com/office/officeart/2005/8/layout/chevron1"/>
+    <dgm:cxn modelId="{489624DC-680D-4D43-9130-B56D34E57F4D}" srcId="{4DE8458E-F535-544D-B9C3-A1CB1BD95C9D}" destId="{49C8E2D7-9E77-414C-8DC6-4B0333718F0C}" srcOrd="3" destOrd="0" parTransId="{75077C44-56B3-B348-9A8E-09CF872B2EB2}" sibTransId="{270C29A8-92CD-B541-BDD3-F69EDC946FC7}"/>
     <dgm:cxn modelId="{46E2D7DD-87FE-CB43-8EE0-9975CDF5298C}" srcId="{E85E46D8-FE2F-5E4C-8A2D-7E4250A81379}" destId="{EF35B85E-C2C0-AE48-8E0E-D1B255B15364}" srcOrd="0" destOrd="0" parTransId="{C0806744-A84B-1B49-BC83-35AC9AB2F020}" sibTransId="{F747612F-531C-3442-A137-A35CBC46A3A2}"/>
-    <dgm:cxn modelId="{1A6C13E7-1973-A944-8F9F-1D628A1D004B}" srcId="{A818F145-D0CE-174E-9AF5-5524CBE9DE19}" destId="{751B3546-8381-9143-87EB-06C2F47250E5}" srcOrd="2" destOrd="0" parTransId="{768DDD7C-884B-5B4A-A8AB-37D0F4E13663}" sibTransId="{54682F6C-BF4E-EC40-91AC-09F7DB70349E}"/>
+    <dgm:cxn modelId="{1A6C13E7-1973-A944-8F9F-1D628A1D004B}" srcId="{A818F145-D0CE-174E-9AF5-5524CBE9DE19}" destId="{751B3546-8381-9143-87EB-06C2F47250E5}" srcOrd="3" destOrd="0" parTransId="{768DDD7C-884B-5B4A-A8AB-37D0F4E13663}" sibTransId="{54682F6C-BF4E-EC40-91AC-09F7DB70349E}"/>
     <dgm:cxn modelId="{9FDF34E8-C9CE-B246-B0C6-C80EE4642094}" type="presOf" srcId="{D7A0C114-3F0F-1F48-8BE6-AB40111DD83D}" destId="{BD08625D-7DEF-4847-9205-B20530AAAE2C}" srcOrd="0" destOrd="0" presId="urn:microsoft.com/office/officeart/2005/8/layout/chevron1"/>
     <dgm:cxn modelId="{BBCF44EC-B15D-9846-8A7F-BC623C88FCF6}" type="presOf" srcId="{325327FE-5C06-D54B-A042-E923FBF7209F}" destId="{A99B9945-4767-B64F-90CB-D27764DB7C2B}" srcOrd="0" destOrd="0" presId="urn:microsoft.com/office/officeart/2005/8/layout/chevron1"/>
     <dgm:cxn modelId="{F906F4F8-D3FC-B14F-969A-7182F793D293}" type="presOf" srcId="{E85E46D8-FE2F-5E4C-8A2D-7E4250A81379}" destId="{4200114D-2D93-9441-B072-EE60824864AF}" srcOrd="0" destOrd="0" presId="urn:microsoft.com/office/officeart/2005/8/layout/chevron1"/>
@@ -3484,11 +3744,15 @@
     <dgm:cxn modelId="{14A5F5B3-B30A-124C-9D4C-9BAAA050AB1A}" type="presParOf" srcId="{A5CD6F7E-3606-1245-8269-B2B2316DD780}" destId="{5299B6EB-752A-6B4F-8E8D-28B319A85EA9}" srcOrd="0" destOrd="0" presId="urn:microsoft.com/office/officeart/2005/8/layout/chevron1"/>
     <dgm:cxn modelId="{52C15999-92B9-8848-8C2A-831EE2370119}" type="presParOf" srcId="{A5CD6F7E-3606-1245-8269-B2B2316DD780}" destId="{BD08625D-7DEF-4847-9205-B20530AAAE2C}" srcOrd="1" destOrd="0" presId="urn:microsoft.com/office/officeart/2005/8/layout/chevron1"/>
     <dgm:cxn modelId="{B1AF0EDE-C041-094F-9369-A74280D178D3}" type="presParOf" srcId="{57F4CB9C-B404-9E49-B79C-DCBB8C9808A9}" destId="{0E8FCABF-4AA2-2649-A4FD-1E8B32809336}" srcOrd="3" destOrd="0" presId="urn:microsoft.com/office/officeart/2005/8/layout/chevron1"/>
-    <dgm:cxn modelId="{A278FADF-6247-7645-AFFD-297D87FB5DCD}" type="presParOf" srcId="{57F4CB9C-B404-9E49-B79C-DCBB8C9808A9}" destId="{63B97BC5-4B6C-7F4E-B36A-038518770763}" srcOrd="4" destOrd="0" presId="urn:microsoft.com/office/officeart/2005/8/layout/chevron1"/>
+    <dgm:cxn modelId="{6EB540F6-6C46-9D49-9DCF-DE0EE4E0F306}" type="presParOf" srcId="{57F4CB9C-B404-9E49-B79C-DCBB8C9808A9}" destId="{391C6C74-87EC-5245-A91D-19BE10F3CB92}" srcOrd="4" destOrd="0" presId="urn:microsoft.com/office/officeart/2005/8/layout/chevron1"/>
+    <dgm:cxn modelId="{2F374B0E-D41C-4A4E-8DA0-4547A7D77939}" type="presParOf" srcId="{391C6C74-87EC-5245-A91D-19BE10F3CB92}" destId="{9CF50B9B-04BE-9D41-835C-7FF0C04FE2CA}" srcOrd="0" destOrd="0" presId="urn:microsoft.com/office/officeart/2005/8/layout/chevron1"/>
+    <dgm:cxn modelId="{50B3A994-EBBF-6749-9F04-2237B7FFF358}" type="presParOf" srcId="{391C6C74-87EC-5245-A91D-19BE10F3CB92}" destId="{6A36D75E-E8FB-F742-906A-4F7B0CE39691}" srcOrd="1" destOrd="0" presId="urn:microsoft.com/office/officeart/2005/8/layout/chevron1"/>
+    <dgm:cxn modelId="{42598BB1-B7BB-7F42-9966-504F58C58157}" type="presParOf" srcId="{57F4CB9C-B404-9E49-B79C-DCBB8C9808A9}" destId="{AA8E3DF5-C5E5-5947-B9D9-94FCD857017A}" srcOrd="5" destOrd="0" presId="urn:microsoft.com/office/officeart/2005/8/layout/chevron1"/>
+    <dgm:cxn modelId="{A278FADF-6247-7645-AFFD-297D87FB5DCD}" type="presParOf" srcId="{57F4CB9C-B404-9E49-B79C-DCBB8C9808A9}" destId="{63B97BC5-4B6C-7F4E-B36A-038518770763}" srcOrd="6" destOrd="0" presId="urn:microsoft.com/office/officeart/2005/8/layout/chevron1"/>
     <dgm:cxn modelId="{DC3221F1-66D6-394D-800B-0E040F7B8F82}" type="presParOf" srcId="{63B97BC5-4B6C-7F4E-B36A-038518770763}" destId="{9498FBED-E3EA-9E4F-90F6-4AFA2732FBD4}" srcOrd="0" destOrd="0" presId="urn:microsoft.com/office/officeart/2005/8/layout/chevron1"/>
     <dgm:cxn modelId="{4F35438A-5E55-CC49-8E67-3D2325A42BE4}" type="presParOf" srcId="{63B97BC5-4B6C-7F4E-B36A-038518770763}" destId="{A99B9945-4767-B64F-90CB-D27764DB7C2B}" srcOrd="1" destOrd="0" presId="urn:microsoft.com/office/officeart/2005/8/layout/chevron1"/>
-    <dgm:cxn modelId="{C7EC0776-213F-8C46-9AA6-71429A3D9751}" type="presParOf" srcId="{57F4CB9C-B404-9E49-B79C-DCBB8C9808A9}" destId="{80522373-94FD-5E4C-B290-60CF64CA60AB}" srcOrd="5" destOrd="0" presId="urn:microsoft.com/office/officeart/2005/8/layout/chevron1"/>
-    <dgm:cxn modelId="{FCE2C0D1-CBAB-D44A-8ADE-DB4BC71EAEC0}" type="presParOf" srcId="{57F4CB9C-B404-9E49-B79C-DCBB8C9808A9}" destId="{5FB54A07-937C-1849-A305-03E5ADB0823F}" srcOrd="6" destOrd="0" presId="urn:microsoft.com/office/officeart/2005/8/layout/chevron1"/>
+    <dgm:cxn modelId="{C7EC0776-213F-8C46-9AA6-71429A3D9751}" type="presParOf" srcId="{57F4CB9C-B404-9E49-B79C-DCBB8C9808A9}" destId="{80522373-94FD-5E4C-B290-60CF64CA60AB}" srcOrd="7" destOrd="0" presId="urn:microsoft.com/office/officeart/2005/8/layout/chevron1"/>
+    <dgm:cxn modelId="{FCE2C0D1-CBAB-D44A-8ADE-DB4BC71EAEC0}" type="presParOf" srcId="{57F4CB9C-B404-9E49-B79C-DCBB8C9808A9}" destId="{5FB54A07-937C-1849-A305-03E5ADB0823F}" srcOrd="8" destOrd="0" presId="urn:microsoft.com/office/officeart/2005/8/layout/chevron1"/>
     <dgm:cxn modelId="{EBF6E841-2531-7B4C-A020-BEBB33D33086}" type="presParOf" srcId="{5FB54A07-937C-1849-A305-03E5ADB0823F}" destId="{4200114D-2D93-9441-B072-EE60824864AF}" srcOrd="0" destOrd="0" presId="urn:microsoft.com/office/officeart/2005/8/layout/chevron1"/>
     <dgm:cxn modelId="{D109DF4C-8D2E-E64A-83CA-A97CA4EB9729}" type="presParOf" srcId="{5FB54A07-937C-1849-A305-03E5ADB0823F}" destId="{E76A3CE6-F72D-F144-9AC6-11F7149C22BB}" srcOrd="1" destOrd="0" presId="urn:microsoft.com/office/officeart/2005/8/layout/chevron1"/>
   </dgm:cxnLst>
@@ -4163,7 +4427,63 @@
               <a:latin typeface="Arial" panose="020B0604020202020204" pitchFamily="34" charset="0"/>
               <a:cs typeface="Arial" panose="020B0604020202020204" pitchFamily="34" charset="0"/>
             </a:rPr>
-            <a:t>Sentiment Analysis: Using Natural Language Processing (NLP) to analyze customer reviews alongside numerical ratings. </a:t>
+            <a:t>Sentiment Analysis: Using Natural Language Processing (NLP) to analyze customer reviews </a:t>
+          </a:r>
+          <a:r>
+            <a:rPr lang="en-US" altLang="zh-TW" dirty="0">
+              <a:latin typeface="Arial" panose="020B0604020202020204" pitchFamily="34" charset="0"/>
+              <a:cs typeface="Arial" panose="020B0604020202020204" pitchFamily="34" charset="0"/>
+            </a:rPr>
+            <a:t>as</a:t>
+          </a:r>
+          <a:r>
+            <a:rPr lang="zh-TW" altLang="en-US" dirty="0">
+              <a:latin typeface="Arial" panose="020B0604020202020204" pitchFamily="34" charset="0"/>
+              <a:cs typeface="Arial" panose="020B0604020202020204" pitchFamily="34" charset="0"/>
+            </a:rPr>
+            <a:t> </a:t>
+          </a:r>
+          <a:r>
+            <a:rPr lang="en-US" altLang="zh-TW" dirty="0">
+              <a:latin typeface="Arial" panose="020B0604020202020204" pitchFamily="34" charset="0"/>
+              <a:cs typeface="Arial" panose="020B0604020202020204" pitchFamily="34" charset="0"/>
+            </a:rPr>
+            <a:t>well</a:t>
+          </a:r>
+          <a:r>
+            <a:rPr lang="zh-TW" altLang="en-US" dirty="0">
+              <a:latin typeface="Arial" panose="020B0604020202020204" pitchFamily="34" charset="0"/>
+              <a:cs typeface="Arial" panose="020B0604020202020204" pitchFamily="34" charset="0"/>
+            </a:rPr>
+            <a:t> </a:t>
+          </a:r>
+          <a:r>
+            <a:rPr lang="en-US" altLang="zh-TW" dirty="0">
+              <a:latin typeface="Arial" panose="020B0604020202020204" pitchFamily="34" charset="0"/>
+              <a:cs typeface="Arial" panose="020B0604020202020204" pitchFamily="34" charset="0"/>
+            </a:rPr>
+            <a:t>as</a:t>
+          </a:r>
+          <a:r>
+            <a:rPr lang="en-US" dirty="0">
+              <a:latin typeface="Arial" panose="020B0604020202020204" pitchFamily="34" charset="0"/>
+              <a:cs typeface="Arial" panose="020B0604020202020204" pitchFamily="34" charset="0"/>
+            </a:rPr>
+            <a:t> numerical </a:t>
+          </a:r>
+          <a:r>
+            <a:rPr lang="en-US" altLang="zh-TW" dirty="0">
+              <a:latin typeface="Arial" panose="020B0604020202020204" pitchFamily="34" charset="0"/>
+              <a:cs typeface="Arial" panose="020B0604020202020204" pitchFamily="34" charset="0"/>
+            </a:rPr>
+            <a:t>scores</a:t>
+          </a:r>
+          <a:r>
+            <a:rPr lang="en-US" dirty="0">
+              <a:latin typeface="Arial" panose="020B0604020202020204" pitchFamily="34" charset="0"/>
+              <a:cs typeface="Arial" panose="020B0604020202020204" pitchFamily="34" charset="0"/>
+            </a:rPr>
+            <a:t>. </a:t>
           </a:r>
         </a:p>
       </dgm:t>
@@ -4214,11 +4534,32 @@
             </a:lnSpc>
           </a:pPr>
           <a:r>
-            <a:rPr lang="en-US">
+            <a:rPr lang="en-US" dirty="0">
               <a:latin typeface="Arial" panose="020B0604020202020204" pitchFamily="34" charset="0"/>
               <a:cs typeface="Arial" panose="020B0604020202020204" pitchFamily="34" charset="0"/>
             </a:rPr>
-            <a:t>Deep Learning Models: Exploring Convolutional Neural Networks (CNNs) to analyze coffee bean images for quality assessment. </a:t>
+            <a:t>Deep Learning Models: Exploring Convolutional Neural Networks (CNNs) to analyze coffee bean </a:t>
+          </a:r>
+          <a:r>
+            <a:rPr lang="en-US" altLang="zh-TW" dirty="0">
+              <a:latin typeface="Arial" panose="020B0604020202020204" pitchFamily="34" charset="0"/>
+              <a:cs typeface="Arial" panose="020B0604020202020204" pitchFamily="34" charset="0"/>
+            </a:rPr>
+            <a:t>images</a:t>
+          </a:r>
+          <a:r>
+            <a:rPr lang="zh-TW" altLang="en-US" dirty="0">
+              <a:latin typeface="Arial" panose="020B0604020202020204" pitchFamily="34" charset="0"/>
+              <a:cs typeface="Arial" panose="020B0604020202020204" pitchFamily="34" charset="0"/>
+            </a:rPr>
+            <a:t> </a:t>
+          </a:r>
+          <a:r>
+            <a:rPr lang="en-US" dirty="0">
+              <a:latin typeface="Arial" panose="020B0604020202020204" pitchFamily="34" charset="0"/>
+              <a:cs typeface="Arial" panose="020B0604020202020204" pitchFamily="34" charset="0"/>
+            </a:rPr>
+            <a:t>for quality assessment. </a:t>
           </a:r>
         </a:p>
       </dgm:t>
@@ -4411,8 +4752,8 @@
       </dsp:nvSpPr>
       <dsp:spPr>
         <a:xfrm>
-          <a:off x="338" y="332495"/>
-          <a:ext cx="2834646" cy="1133858"/>
+          <a:off x="2626" y="979080"/>
+          <a:ext cx="2310002" cy="810000"/>
         </a:xfrm>
         <a:prstGeom prst="chevron">
           <a:avLst/>
@@ -4485,8 +4826,8 @@
         </a:p>
       </dsp:txBody>
       <dsp:txXfrm>
-        <a:off x="567267" y="332495"/>
-        <a:ext cx="1700788" cy="1133858"/>
+        <a:off x="407626" y="979080"/>
+        <a:ext cx="1500002" cy="810000"/>
       </dsp:txXfrm>
     </dsp:sp>
     <dsp:sp modelId="{5A72A6F0-89A0-7E48-BBBA-5F74AC659B56}">
@@ -4496,8 +4837,8 @@
       </dsp:nvSpPr>
       <dsp:spPr>
         <a:xfrm>
-          <a:off x="338" y="1608086"/>
-          <a:ext cx="2267717" cy="2312578"/>
+          <a:off x="2626" y="1890330"/>
+          <a:ext cx="1848001" cy="1383750"/>
         </a:xfrm>
         <a:prstGeom prst="rect">
           <a:avLst/>
@@ -4545,8 +4886,8 @@
         </a:p>
       </dsp:txBody>
       <dsp:txXfrm>
-        <a:off x="338" y="1608086"/>
-        <a:ext cx="2267717" cy="2312578"/>
+        <a:off x="2626" y="1890330"/>
+        <a:ext cx="1848001" cy="1383750"/>
       </dsp:txXfrm>
     </dsp:sp>
     <dsp:sp modelId="{5299B6EB-752A-6B4F-8E8D-28B319A85EA9}">
@@ -4556,8 +4897,8 @@
       </dsp:nvSpPr>
       <dsp:spPr>
         <a:xfrm>
-          <a:off x="2618985" y="332495"/>
-          <a:ext cx="2834646" cy="1133858"/>
+          <a:off x="2096629" y="979080"/>
+          <a:ext cx="2310002" cy="810000"/>
         </a:xfrm>
         <a:prstGeom prst="chevron">
           <a:avLst/>
@@ -4599,12 +4940,12 @@
         </a:fontRef>
       </dsp:style>
       <dsp:txBody>
-        <a:bodyPr spcFirstLastPara="0" vert="horz" wrap="square" lIns="72009" tIns="24003" rIns="24003" bIns="24003" numCol="1" spcCol="1270" anchor="ctr" anchorCtr="0">
+        <a:bodyPr spcFirstLastPara="0" vert="horz" wrap="square" lIns="64008" tIns="21336" rIns="21336" bIns="21336" numCol="1" spcCol="1270" anchor="ctr" anchorCtr="0">
           <a:noAutofit/>
         </a:bodyPr>
         <a:lstStyle/>
         <a:p>
-          <a:pPr marL="0" lvl="0" indent="0" algn="ctr" defTabSz="800100">
+          <a:pPr marL="0" lvl="0" indent="0" algn="ctr" defTabSz="711200">
             <a:lnSpc>
               <a:spcPct val="90000"/>
             </a:lnSpc>
@@ -4617,21 +4958,63 @@
             <a:buNone/>
           </a:pPr>
           <a:r>
-            <a:rPr lang="en-US" sz="1800" b="1" kern="1200" dirty="0">
+            <a:rPr lang="en-US" sz="1600" b="1" kern="1200" dirty="0">
               <a:latin typeface="Arial" panose="020B0604020202020204" pitchFamily="34" charset="0"/>
               <a:cs typeface="Arial" panose="020B0604020202020204" pitchFamily="34" charset="0"/>
             </a:rPr>
-            <a:t>Data Sources &amp; Preprocessing </a:t>
+            <a:t>Data</a:t>
           </a:r>
-          <a:endParaRPr lang="en-US" sz="1800" kern="1200" dirty="0">
+          <a:r>
+            <a:rPr lang="zh-TW" altLang="en-US" sz="1600" b="1" kern="1200" dirty="0">
+              <a:latin typeface="Arial" panose="020B0604020202020204" pitchFamily="34" charset="0"/>
+              <a:cs typeface="Arial" panose="020B0604020202020204" pitchFamily="34" charset="0"/>
+            </a:rPr>
+            <a:t> </a:t>
+          </a:r>
+          <a:r>
+            <a:rPr lang="en-US" altLang="zh-TW" sz="1600" b="1" kern="1200" dirty="0">
+              <a:latin typeface="Arial" panose="020B0604020202020204" pitchFamily="34" charset="0"/>
+              <a:cs typeface="Arial" panose="020B0604020202020204" pitchFamily="34" charset="0"/>
+            </a:rPr>
+            <a:t>Wrangling</a:t>
+          </a:r>
+          <a:r>
+            <a:rPr lang="zh-TW" altLang="en-US" sz="1600" b="1" kern="1200" dirty="0">
+              <a:latin typeface="Arial" panose="020B0604020202020204" pitchFamily="34" charset="0"/>
+              <a:cs typeface="Arial" panose="020B0604020202020204" pitchFamily="34" charset="0"/>
+            </a:rPr>
+            <a:t> </a:t>
+          </a:r>
+          <a:r>
+            <a:rPr lang="en-US" altLang="zh-TW" sz="1600" b="1" kern="1200" dirty="0">
+              <a:latin typeface="Arial" panose="020B0604020202020204" pitchFamily="34" charset="0"/>
+              <a:cs typeface="Arial" panose="020B0604020202020204" pitchFamily="34" charset="0"/>
+            </a:rPr>
+            <a:t>&amp;</a:t>
+          </a:r>
+          <a:r>
+            <a:rPr lang="zh-TW" altLang="en-US" sz="1600" b="1" kern="1200" dirty="0">
+              <a:latin typeface="Arial" panose="020B0604020202020204" pitchFamily="34" charset="0"/>
+              <a:cs typeface="Arial" panose="020B0604020202020204" pitchFamily="34" charset="0"/>
+            </a:rPr>
+            <a:t> </a:t>
+          </a:r>
+          <a:r>
+            <a:rPr lang="en-US" altLang="zh-TW" sz="1600" b="1" kern="1200" dirty="0">
+              <a:latin typeface="Arial" panose="020B0604020202020204" pitchFamily="34" charset="0"/>
+              <a:cs typeface="Arial" panose="020B0604020202020204" pitchFamily="34" charset="0"/>
+            </a:rPr>
+            <a:t>EDA</a:t>
+          </a:r>
+          <a:endParaRPr lang="en-US" sz="1600" kern="1200" dirty="0">
             <a:latin typeface="Arial" panose="020B0604020202020204" pitchFamily="34" charset="0"/>
             <a:cs typeface="Arial" panose="020B0604020202020204" pitchFamily="34" charset="0"/>
           </a:endParaRPr>
         </a:p>
       </dsp:txBody>
       <dsp:txXfrm>
-        <a:off x="3185914" y="332495"/>
-        <a:ext cx="1700788" cy="1133858"/>
+        <a:off x="2501629" y="979080"/>
+        <a:ext cx="1500002" cy="810000"/>
       </dsp:txXfrm>
     </dsp:sp>
     <dsp:sp modelId="{BD08625D-7DEF-4847-9205-B20530AAAE2C}">
@@ -4641,8 +5024,8 @@
       </dsp:nvSpPr>
       <dsp:spPr>
         <a:xfrm>
-          <a:off x="2618985" y="1608086"/>
-          <a:ext cx="2267717" cy="2312578"/>
+          <a:off x="2096629" y="1890330"/>
+          <a:ext cx="1848001" cy="1383750"/>
         </a:xfrm>
         <a:prstGeom prst="rect">
           <a:avLst/>
@@ -4688,22 +5071,15 @@
               <a:latin typeface="Arial" panose="020B0604020202020204" pitchFamily="34" charset="0"/>
               <a:cs typeface="Arial" panose="020B0604020202020204" pitchFamily="34" charset="0"/>
             </a:rPr>
-            <a:t>Data Cleaning &amp; Preprocessing </a:t>
+            <a:t>Data </a:t>
           </a:r>
-        </a:p>
-        <a:p>
-          <a:pPr marL="171450" lvl="1" indent="-171450" algn="l" defTabSz="711200">
-            <a:lnSpc>
-              <a:spcPct val="90000"/>
-            </a:lnSpc>
-            <a:spcBef>
-              <a:spcPct val="0"/>
-            </a:spcBef>
-            <a:spcAft>
-              <a:spcPct val="15000"/>
-            </a:spcAft>
-            <a:buChar char="•"/>
-          </a:pPr>
+          <a:r>
+            <a:rPr lang="en-US" altLang="zh-TW" sz="1600" kern="1200" dirty="0">
+              <a:latin typeface="Arial" panose="020B0604020202020204" pitchFamily="34" charset="0"/>
+              <a:cs typeface="Arial" panose="020B0604020202020204" pitchFamily="34" charset="0"/>
+            </a:rPr>
+            <a:t>Wrangling</a:t>
+          </a:r>
           <a:endParaRPr lang="en-US" sz="1600" kern="1200" dirty="0">
             <a:latin typeface="Arial" panose="020B0604020202020204" pitchFamily="34" charset="0"/>
             <a:cs typeface="Arial" panose="020B0604020202020204" pitchFamily="34" charset="0"/>
@@ -4743,24 +5119,6 @@
             </a:spcAft>
             <a:buChar char="•"/>
           </a:pPr>
-          <a:endParaRPr lang="en-US" sz="1600" kern="1200" dirty="0">
-            <a:latin typeface="Arial" panose="020B0604020202020204" pitchFamily="34" charset="0"/>
-            <a:cs typeface="Arial" panose="020B0604020202020204" pitchFamily="34" charset="0"/>
-          </a:endParaRPr>
-        </a:p>
-        <a:p>
-          <a:pPr marL="171450" lvl="1" indent="-171450" algn="l" defTabSz="711200">
-            <a:lnSpc>
-              <a:spcPct val="90000"/>
-            </a:lnSpc>
-            <a:spcBef>
-              <a:spcPct val="0"/>
-            </a:spcBef>
-            <a:spcAft>
-              <a:spcPct val="15000"/>
-            </a:spcAft>
-            <a:buChar char="•"/>
-          </a:pPr>
           <a:r>
             <a:rPr lang="en-US" sz="1600" kern="1200" dirty="0">
               <a:latin typeface="Arial" panose="020B0604020202020204" pitchFamily="34" charset="0"/>
@@ -4768,24 +5126,6 @@
             </a:rPr>
             <a:t>Data Visualization </a:t>
           </a:r>
-        </a:p>
-        <a:p>
-          <a:pPr marL="171450" lvl="1" indent="-171450" algn="l" defTabSz="711200">
-            <a:lnSpc>
-              <a:spcPct val="90000"/>
-            </a:lnSpc>
-            <a:spcBef>
-              <a:spcPct val="0"/>
-            </a:spcBef>
-            <a:spcAft>
-              <a:spcPct val="15000"/>
-            </a:spcAft>
-            <a:buChar char="•"/>
-          </a:pPr>
-          <a:endParaRPr lang="en-US" sz="1600" kern="1200" dirty="0">
-            <a:latin typeface="Arial" panose="020B0604020202020204" pitchFamily="34" charset="0"/>
-            <a:cs typeface="Arial" panose="020B0604020202020204" pitchFamily="34" charset="0"/>
-          </a:endParaRPr>
         </a:p>
         <a:p>
           <a:pPr marL="171450" lvl="1" indent="-171450" algn="l" defTabSz="711200">
@@ -4810,19 +5150,19 @@
         </a:p>
       </dsp:txBody>
       <dsp:txXfrm>
-        <a:off x="2618985" y="1608086"/>
-        <a:ext cx="2267717" cy="2312578"/>
+        <a:off x="2096629" y="1890330"/>
+        <a:ext cx="1848001" cy="1383750"/>
       </dsp:txXfrm>
     </dsp:sp>
-    <dsp:sp modelId="{9498FBED-E3EA-9E4F-90F6-4AFA2732FBD4}">
+    <dsp:sp modelId="{9CF50B9B-04BE-9D41-835C-7FF0C04FE2CA}">
       <dsp:nvSpPr>
         <dsp:cNvPr id="0" name=""/>
         <dsp:cNvSpPr/>
       </dsp:nvSpPr>
       <dsp:spPr>
         <a:xfrm>
-          <a:off x="5237632" y="332495"/>
-          <a:ext cx="2834646" cy="1133858"/>
+          <a:off x="4190631" y="979080"/>
+          <a:ext cx="2310002" cy="810000"/>
         </a:xfrm>
         <a:prstGeom prst="chevron">
           <a:avLst/>
@@ -4864,12 +5204,12 @@
         </a:fontRef>
       </dsp:style>
       <dsp:txBody>
-        <a:bodyPr spcFirstLastPara="0" vert="horz" wrap="square" lIns="72009" tIns="24003" rIns="24003" bIns="24003" numCol="1" spcCol="1270" anchor="ctr" anchorCtr="0">
+        <a:bodyPr spcFirstLastPara="0" vert="horz" wrap="square" lIns="60007" tIns="20003" rIns="20003" bIns="20003" numCol="1" spcCol="1270" anchor="ctr" anchorCtr="0">
           <a:noAutofit/>
         </a:bodyPr>
         <a:lstStyle/>
         <a:p>
-          <a:pPr marL="0" lvl="0" indent="0" algn="ctr" defTabSz="800100">
+          <a:pPr marL="0" lvl="0" indent="0" algn="ctr" defTabSz="666750">
             <a:lnSpc>
               <a:spcPct val="90000"/>
             </a:lnSpc>
@@ -4882,21 +5222,220 @@
             <a:buNone/>
           </a:pPr>
           <a:r>
-            <a:rPr lang="en-US" sz="1800" b="1" kern="1200" dirty="0">
+            <a:rPr lang="en-US" altLang="zh-TW" sz="1500" b="1" kern="1200" dirty="0">
               <a:latin typeface="Arial" panose="020B0604020202020204" pitchFamily="34" charset="0"/>
               <a:cs typeface="Arial" panose="020B0604020202020204" pitchFamily="34" charset="0"/>
             </a:rPr>
-            <a:t>Machine Learning Methodology </a:t>
+            <a:t>Pre</a:t>
           </a:r>
-          <a:endParaRPr lang="en-US" sz="1800" kern="1200" dirty="0">
+          <a:r>
+            <a:rPr lang="en-US" sz="1500" b="1" kern="1200" dirty="0">
+              <a:latin typeface="Arial" panose="020B0604020202020204" pitchFamily="34" charset="0"/>
+              <a:cs typeface="Arial" panose="020B0604020202020204" pitchFamily="34" charset="0"/>
+            </a:rPr>
+            <a:t>processing </a:t>
+          </a:r>
+          <a:endParaRPr lang="en-US" sz="1500" kern="1200" dirty="0">
             <a:latin typeface="Arial" panose="020B0604020202020204" pitchFamily="34" charset="0"/>
             <a:cs typeface="Arial" panose="020B0604020202020204" pitchFamily="34" charset="0"/>
           </a:endParaRPr>
         </a:p>
       </dsp:txBody>
       <dsp:txXfrm>
-        <a:off x="5804561" y="332495"/>
-        <a:ext cx="1700788" cy="1133858"/>
+        <a:off x="4595631" y="979080"/>
+        <a:ext cx="1500002" cy="810000"/>
+      </dsp:txXfrm>
+    </dsp:sp>
+    <dsp:sp modelId="{6A36D75E-E8FB-F742-906A-4F7B0CE39691}">
+      <dsp:nvSpPr>
+        <dsp:cNvPr id="0" name=""/>
+        <dsp:cNvSpPr/>
+      </dsp:nvSpPr>
+      <dsp:spPr>
+        <a:xfrm>
+          <a:off x="4190631" y="1890330"/>
+          <a:ext cx="1848001" cy="1383750"/>
+        </a:xfrm>
+        <a:prstGeom prst="rect">
+          <a:avLst/>
+        </a:prstGeom>
+        <a:noFill/>
+        <a:ln>
+          <a:noFill/>
+        </a:ln>
+        <a:effectLst/>
+      </dsp:spPr>
+      <dsp:style>
+        <a:lnRef idx="0">
+          <a:scrgbClr r="0" g="0" b="0"/>
+        </a:lnRef>
+        <a:fillRef idx="0">
+          <a:scrgbClr r="0" g="0" b="0"/>
+        </a:fillRef>
+        <a:effectRef idx="0">
+          <a:scrgbClr r="0" g="0" b="0"/>
+        </a:effectRef>
+        <a:fontRef idx="minor"/>
+      </dsp:style>
+      <dsp:txBody>
+        <a:bodyPr spcFirstLastPara="0" vert="horz" wrap="square" lIns="0" tIns="0" rIns="0" bIns="0" numCol="1" spcCol="1270" anchor="t" anchorCtr="0">
+          <a:noAutofit/>
+        </a:bodyPr>
+        <a:lstStyle/>
+        <a:p>
+          <a:pPr marL="114300" lvl="1" indent="-114300" algn="l" defTabSz="666750">
+            <a:lnSpc>
+              <a:spcPct val="90000"/>
+            </a:lnSpc>
+            <a:spcBef>
+              <a:spcPct val="0"/>
+            </a:spcBef>
+            <a:spcAft>
+              <a:spcPct val="15000"/>
+            </a:spcAft>
+            <a:buChar char="•"/>
+          </a:pPr>
+          <a:r>
+            <a:rPr lang="en-US" sz="1500" b="0" kern="1200" dirty="0">
+              <a:effectLst/>
+              <a:latin typeface="Arial" panose="020B0604020202020204" pitchFamily="34" charset="0"/>
+              <a:cs typeface="Arial" panose="020B0604020202020204" pitchFamily="34" charset="0"/>
+            </a:rPr>
+            <a:t>Feature Scaling </a:t>
+          </a:r>
+          <a:endParaRPr lang="en-US" sz="1500" b="0" kern="1200" dirty="0">
+            <a:latin typeface="Arial" panose="020B0604020202020204" pitchFamily="34" charset="0"/>
+            <a:cs typeface="Arial" panose="020B0604020202020204" pitchFamily="34" charset="0"/>
+          </a:endParaRPr>
+        </a:p>
+        <a:p>
+          <a:pPr marL="114300" lvl="1" indent="-114300" algn="l" defTabSz="666750">
+            <a:lnSpc>
+              <a:spcPct val="90000"/>
+            </a:lnSpc>
+            <a:spcBef>
+              <a:spcPct val="0"/>
+            </a:spcBef>
+            <a:spcAft>
+              <a:spcPct val="15000"/>
+            </a:spcAft>
+            <a:buChar char="•"/>
+          </a:pPr>
+          <a:r>
+            <a:rPr lang="en-US" altLang="zh-TW" sz="1500" b="0" kern="1200" dirty="0">
+              <a:latin typeface="Arial" panose="020B0604020202020204" pitchFamily="34" charset="0"/>
+              <a:cs typeface="Arial" panose="020B0604020202020204" pitchFamily="34" charset="0"/>
+            </a:rPr>
+            <a:t>Split</a:t>
+          </a:r>
+          <a:r>
+            <a:rPr lang="zh-TW" altLang="en-US" sz="1500" b="0" kern="1200" dirty="0">
+              <a:latin typeface="Arial" panose="020B0604020202020204" pitchFamily="34" charset="0"/>
+              <a:cs typeface="Arial" panose="020B0604020202020204" pitchFamily="34" charset="0"/>
+            </a:rPr>
+            <a:t> </a:t>
+          </a:r>
+          <a:r>
+            <a:rPr lang="en-US" altLang="zh-TW" sz="1500" b="0" kern="1200" dirty="0">
+              <a:latin typeface="Arial" panose="020B0604020202020204" pitchFamily="34" charset="0"/>
+              <a:cs typeface="Arial" panose="020B0604020202020204" pitchFamily="34" charset="0"/>
+            </a:rPr>
+            <a:t>dataset</a:t>
+          </a:r>
+          <a:endParaRPr lang="en-US" sz="1500" b="0" kern="1200" dirty="0">
+            <a:latin typeface="Arial" panose="020B0604020202020204" pitchFamily="34" charset="0"/>
+            <a:cs typeface="Arial" panose="020B0604020202020204" pitchFamily="34" charset="0"/>
+          </a:endParaRPr>
+        </a:p>
+      </dsp:txBody>
+      <dsp:txXfrm>
+        <a:off x="4190631" y="1890330"/>
+        <a:ext cx="1848001" cy="1383750"/>
+      </dsp:txXfrm>
+    </dsp:sp>
+    <dsp:sp modelId="{9498FBED-E3EA-9E4F-90F6-4AFA2732FBD4}">
+      <dsp:nvSpPr>
+        <dsp:cNvPr id="0" name=""/>
+        <dsp:cNvSpPr/>
+      </dsp:nvSpPr>
+      <dsp:spPr>
+        <a:xfrm>
+          <a:off x="6284633" y="979080"/>
+          <a:ext cx="2310002" cy="810000"/>
+        </a:xfrm>
+        <a:prstGeom prst="chevron">
+          <a:avLst/>
+        </a:prstGeom>
+        <a:solidFill>
+          <a:schemeClr val="accent1">
+            <a:hueOff val="0"/>
+            <a:satOff val="0"/>
+            <a:lumOff val="0"/>
+            <a:alphaOff val="0"/>
+          </a:schemeClr>
+        </a:solidFill>
+        <a:ln w="12700" cap="flat" cmpd="sng" algn="ctr">
+          <a:solidFill>
+            <a:schemeClr val="lt1">
+              <a:hueOff val="0"/>
+              <a:satOff val="0"/>
+              <a:lumOff val="0"/>
+              <a:alphaOff val="0"/>
+            </a:schemeClr>
+          </a:solidFill>
+          <a:prstDash val="solid"/>
+          <a:miter lim="800000"/>
+        </a:ln>
+        <a:effectLst/>
+      </dsp:spPr>
+      <dsp:style>
+        <a:lnRef idx="2">
+          <a:scrgbClr r="0" g="0" b="0"/>
+        </a:lnRef>
+        <a:fillRef idx="1">
+          <a:scrgbClr r="0" g="0" b="0"/>
+        </a:fillRef>
+        <a:effectRef idx="0">
+          <a:scrgbClr r="0" g="0" b="0"/>
+        </a:effectRef>
+        <a:fontRef idx="minor">
+          <a:schemeClr val="lt1"/>
+        </a:fontRef>
+      </dsp:style>
+      <dsp:txBody>
+        <a:bodyPr spcFirstLastPara="0" vert="horz" wrap="square" lIns="64008" tIns="21336" rIns="21336" bIns="21336" numCol="1" spcCol="1270" anchor="ctr" anchorCtr="0">
+          <a:noAutofit/>
+        </a:bodyPr>
+        <a:lstStyle/>
+        <a:p>
+          <a:pPr marL="0" lvl="0" indent="0" algn="ctr" defTabSz="711200">
+            <a:lnSpc>
+              <a:spcPct val="90000"/>
+            </a:lnSpc>
+            <a:spcBef>
+              <a:spcPct val="0"/>
+            </a:spcBef>
+            <a:spcAft>
+              <a:spcPct val="35000"/>
+            </a:spcAft>
+            <a:buNone/>
+          </a:pPr>
+          <a:r>
+            <a:rPr lang="en-US" sz="1600" b="1" kern="1200" dirty="0">
+              <a:latin typeface="Arial" panose="020B0604020202020204" pitchFamily="34" charset="0"/>
+              <a:cs typeface="Arial" panose="020B0604020202020204" pitchFamily="34" charset="0"/>
+            </a:rPr>
+            <a:t>Machine Learning Methodology</a:t>
+          </a:r>
+          <a:endParaRPr lang="en-US" sz="1600" kern="1200" dirty="0">
+            <a:latin typeface="Arial" panose="020B0604020202020204" pitchFamily="34" charset="0"/>
+            <a:cs typeface="Arial" panose="020B0604020202020204" pitchFamily="34" charset="0"/>
+          </a:endParaRPr>
+        </a:p>
+      </dsp:txBody>
+      <dsp:txXfrm>
+        <a:off x="6689633" y="979080"/>
+        <a:ext cx="1500002" cy="810000"/>
       </dsp:txXfrm>
     </dsp:sp>
     <dsp:sp modelId="{A99B9945-4767-B64F-90CB-D27764DB7C2B}">
@@ -4906,8 +5445,8 @@
       </dsp:nvSpPr>
       <dsp:spPr>
         <a:xfrm>
-          <a:off x="5237632" y="1608086"/>
-          <a:ext cx="2267717" cy="2312578"/>
+          <a:off x="6284633" y="1890330"/>
+          <a:ext cx="1848001" cy="1383750"/>
         </a:xfrm>
         <a:prstGeom prst="rect">
           <a:avLst/>
@@ -5000,8 +5539,8 @@
         </a:p>
       </dsp:txBody>
       <dsp:txXfrm>
-        <a:off x="5237632" y="1608086"/>
-        <a:ext cx="2267717" cy="2312578"/>
+        <a:off x="6284633" y="1890330"/>
+        <a:ext cx="1848001" cy="1383750"/>
       </dsp:txXfrm>
     </dsp:sp>
     <dsp:sp modelId="{4200114D-2D93-9441-B072-EE60824864AF}">
@@ -5011,8 +5550,8 @@
       </dsp:nvSpPr>
       <dsp:spPr>
         <a:xfrm>
-          <a:off x="7856279" y="332495"/>
-          <a:ext cx="2834646" cy="1133858"/>
+          <a:off x="8378635" y="979080"/>
+          <a:ext cx="2310002" cy="810000"/>
         </a:xfrm>
         <a:prstGeom prst="chevron">
           <a:avLst/>
@@ -5085,8 +5624,8 @@
         </a:p>
       </dsp:txBody>
       <dsp:txXfrm>
-        <a:off x="8423208" y="332495"/>
-        <a:ext cx="1700788" cy="1133858"/>
+        <a:off x="8783635" y="979080"/>
+        <a:ext cx="1500002" cy="810000"/>
       </dsp:txXfrm>
     </dsp:sp>
     <dsp:sp modelId="{E76A3CE6-F72D-F144-9AC6-11F7149C22BB}">
@@ -5096,8 +5635,8 @@
       </dsp:nvSpPr>
       <dsp:spPr>
         <a:xfrm>
-          <a:off x="7856279" y="1608086"/>
-          <a:ext cx="2267717" cy="2312578"/>
+          <a:off x="8378635" y="1890330"/>
+          <a:ext cx="1848001" cy="1383750"/>
         </a:xfrm>
         <a:prstGeom prst="rect">
           <a:avLst/>
@@ -5169,8 +5708,8 @@
         </a:p>
       </dsp:txBody>
       <dsp:txXfrm>
-        <a:off x="7856279" y="1608086"/>
-        <a:ext cx="2267717" cy="2312578"/>
+        <a:off x="8378635" y="1890330"/>
+        <a:ext cx="1848001" cy="1383750"/>
       </dsp:txXfrm>
     </dsp:sp>
   </dsp:spTree>
@@ -5967,7 +6506,63 @@
               <a:latin typeface="Arial" panose="020B0604020202020204" pitchFamily="34" charset="0"/>
               <a:cs typeface="Arial" panose="020B0604020202020204" pitchFamily="34" charset="0"/>
             </a:rPr>
-            <a:t>Sentiment Analysis: Using Natural Language Processing (NLP) to analyze customer reviews alongside numerical ratings. </a:t>
+            <a:t>Sentiment Analysis: Using Natural Language Processing (NLP) to analyze customer reviews </a:t>
+          </a:r>
+          <a:r>
+            <a:rPr lang="en-US" altLang="zh-TW" sz="1800" kern="1200" dirty="0">
+              <a:latin typeface="Arial" panose="020B0604020202020204" pitchFamily="34" charset="0"/>
+              <a:cs typeface="Arial" panose="020B0604020202020204" pitchFamily="34" charset="0"/>
+            </a:rPr>
+            <a:t>as</a:t>
+          </a:r>
+          <a:r>
+            <a:rPr lang="zh-TW" altLang="en-US" sz="1800" kern="1200" dirty="0">
+              <a:latin typeface="Arial" panose="020B0604020202020204" pitchFamily="34" charset="0"/>
+              <a:cs typeface="Arial" panose="020B0604020202020204" pitchFamily="34" charset="0"/>
+            </a:rPr>
+            <a:t> </a:t>
+          </a:r>
+          <a:r>
+            <a:rPr lang="en-US" altLang="zh-TW" sz="1800" kern="1200" dirty="0">
+              <a:latin typeface="Arial" panose="020B0604020202020204" pitchFamily="34" charset="0"/>
+              <a:cs typeface="Arial" panose="020B0604020202020204" pitchFamily="34" charset="0"/>
+            </a:rPr>
+            <a:t>well</a:t>
+          </a:r>
+          <a:r>
+            <a:rPr lang="zh-TW" altLang="en-US" sz="1800" kern="1200" dirty="0">
+              <a:latin typeface="Arial" panose="020B0604020202020204" pitchFamily="34" charset="0"/>
+              <a:cs typeface="Arial" panose="020B0604020202020204" pitchFamily="34" charset="0"/>
+            </a:rPr>
+            <a:t> </a:t>
+          </a:r>
+          <a:r>
+            <a:rPr lang="en-US" altLang="zh-TW" sz="1800" kern="1200" dirty="0">
+              <a:latin typeface="Arial" panose="020B0604020202020204" pitchFamily="34" charset="0"/>
+              <a:cs typeface="Arial" panose="020B0604020202020204" pitchFamily="34" charset="0"/>
+            </a:rPr>
+            <a:t>as</a:t>
+          </a:r>
+          <a:r>
+            <a:rPr lang="en-US" sz="1800" kern="1200" dirty="0">
+              <a:latin typeface="Arial" panose="020B0604020202020204" pitchFamily="34" charset="0"/>
+              <a:cs typeface="Arial" panose="020B0604020202020204" pitchFamily="34" charset="0"/>
+            </a:rPr>
+            <a:t> numerical </a:t>
+          </a:r>
+          <a:r>
+            <a:rPr lang="en-US" altLang="zh-TW" sz="1800" kern="1200" dirty="0">
+              <a:latin typeface="Arial" panose="020B0604020202020204" pitchFamily="34" charset="0"/>
+              <a:cs typeface="Arial" panose="020B0604020202020204" pitchFamily="34" charset="0"/>
+            </a:rPr>
+            <a:t>scores</a:t>
+          </a:r>
+          <a:r>
+            <a:rPr lang="en-US" sz="1800" kern="1200" dirty="0">
+              <a:latin typeface="Arial" panose="020B0604020202020204" pitchFamily="34" charset="0"/>
+              <a:cs typeface="Arial" panose="020B0604020202020204" pitchFamily="34" charset="0"/>
+            </a:rPr>
+            <a:t>. </a:t>
           </a:r>
         </a:p>
       </dsp:txBody>
@@ -6123,11 +6718,32 @@
             <a:buNone/>
           </a:pPr>
           <a:r>
-            <a:rPr lang="en-US" sz="1800" kern="1200">
+            <a:rPr lang="en-US" sz="1800" kern="1200" dirty="0">
               <a:latin typeface="Arial" panose="020B0604020202020204" pitchFamily="34" charset="0"/>
               <a:cs typeface="Arial" panose="020B0604020202020204" pitchFamily="34" charset="0"/>
             </a:rPr>
-            <a:t>Deep Learning Models: Exploring Convolutional Neural Networks (CNNs) to analyze coffee bean images for quality assessment. </a:t>
+            <a:t>Deep Learning Models: Exploring Convolutional Neural Networks (CNNs) to analyze coffee bean </a:t>
+          </a:r>
+          <a:r>
+            <a:rPr lang="en-US" altLang="zh-TW" sz="1800" kern="1200" dirty="0">
+              <a:latin typeface="Arial" panose="020B0604020202020204" pitchFamily="34" charset="0"/>
+              <a:cs typeface="Arial" panose="020B0604020202020204" pitchFamily="34" charset="0"/>
+            </a:rPr>
+            <a:t>images</a:t>
+          </a:r>
+          <a:r>
+            <a:rPr lang="zh-TW" altLang="en-US" sz="1800" kern="1200" dirty="0">
+              <a:latin typeface="Arial" panose="020B0604020202020204" pitchFamily="34" charset="0"/>
+              <a:cs typeface="Arial" panose="020B0604020202020204" pitchFamily="34" charset="0"/>
+            </a:rPr>
+            <a:t> </a:t>
+          </a:r>
+          <a:r>
+            <a:rPr lang="en-US" sz="1800" kern="1200" dirty="0">
+              <a:latin typeface="Arial" panose="020B0604020202020204" pitchFamily="34" charset="0"/>
+              <a:cs typeface="Arial" panose="020B0604020202020204" pitchFamily="34" charset="0"/>
+            </a:rPr>
+            <a:t>for quality assessment. </a:t>
           </a:r>
         </a:p>
       </dsp:txBody>
@@ -10009,7 +10625,7 @@
           <a:p>
             <a:fld id="{EB639E76-C27A-3442-AB52-A1B91A4E5B2B}" type="datetimeFigureOut">
               <a:rPr lang="en-US" smtClean="0"/>
-              <a:t>3/27/25</a:t>
+              <a:t>3/28/25</a:t>
             </a:fld>
             <a:endParaRPr lang="en-US"/>
           </a:p>
@@ -10513,7 +11129,7 @@
           <a:p>
             <a:fld id="{D1D1EADE-8E88-4C7C-8AC5-FB148DE4940E}" type="datetime1">
               <a:rPr lang="en-US" smtClean="0"/>
-              <a:t>3/27/25</a:t>
+              <a:t>3/28/25</a:t>
             </a:fld>
             <a:endParaRPr lang="en-US"/>
           </a:p>
@@ -10713,7 +11329,7 @@
           <a:p>
             <a:fld id="{EC3C8B9C-477D-492A-96AD-1FC2CC997A73}" type="datetime1">
               <a:rPr lang="en-US" smtClean="0"/>
-              <a:t>3/27/25</a:t>
+              <a:t>3/28/25</a:t>
             </a:fld>
             <a:endParaRPr lang="en-US"/>
           </a:p>
@@ -10923,7 +11539,7 @@
           <a:p>
             <a:fld id="{42D3AED5-E26D-4E29-B1B3-7847B6779594}" type="datetime1">
               <a:rPr lang="en-US" smtClean="0"/>
-              <a:t>3/27/25</a:t>
+              <a:t>3/28/25</a:t>
             </a:fld>
             <a:endParaRPr lang="en-US"/>
           </a:p>
@@ -11123,7 +11739,7 @@
           <a:p>
             <a:fld id="{157B6794-849E-4626-908B-D15793550EFB}" type="datetime1">
               <a:rPr lang="en-US" smtClean="0"/>
-              <a:t>3/27/25</a:t>
+              <a:t>3/28/25</a:t>
             </a:fld>
             <a:endParaRPr lang="en-US"/>
           </a:p>
@@ -11399,7 +12015,7 @@
           <a:p>
             <a:fld id="{63DB64E7-5594-42A3-ADBF-E95A7ACEAD64}" type="datetime1">
               <a:rPr lang="en-US" smtClean="0"/>
-              <a:t>3/27/25</a:t>
+              <a:t>3/28/25</a:t>
             </a:fld>
             <a:endParaRPr lang="en-US"/>
           </a:p>
@@ -11672,7 +12288,7 @@
           <a:p>
             <a:fld id="{18462B0B-D248-4FFB-8695-AD7FA4B1284A}" type="datetime1">
               <a:rPr lang="en-US" smtClean="0"/>
-              <a:t>3/27/25</a:t>
+              <a:t>3/28/25</a:t>
             </a:fld>
             <a:endParaRPr lang="en-US"/>
           </a:p>
@@ -12095,7 +12711,7 @@
           <a:p>
             <a:fld id="{D0378EFB-9159-4510-B73F-4F0409ADE937}" type="datetime1">
               <a:rPr lang="en-US" smtClean="0"/>
-              <a:t>3/27/25</a:t>
+              <a:t>3/28/25</a:t>
             </a:fld>
             <a:endParaRPr lang="en-US"/>
           </a:p>
@@ -12237,7 +12853,7 @@
           <a:p>
             <a:fld id="{89BC9412-2452-4BED-A324-9D8C115361AD}" type="datetime1">
               <a:rPr lang="en-US" smtClean="0"/>
-              <a:t>3/27/25</a:t>
+              <a:t>3/28/25</a:t>
             </a:fld>
             <a:endParaRPr lang="en-US"/>
           </a:p>
@@ -12350,7 +12966,7 @@
           <a:p>
             <a:fld id="{F5318F62-D251-40E8-A23C-F4CFE9FEAB41}" type="datetime1">
               <a:rPr lang="en-US" smtClean="0"/>
-              <a:t>3/27/25</a:t>
+              <a:t>3/28/25</a:t>
             </a:fld>
             <a:endParaRPr lang="en-US"/>
           </a:p>
@@ -12663,7 +13279,7 @@
           <a:p>
             <a:fld id="{44F76144-149E-4874-93A5-554A0357CF82}" type="datetime1">
               <a:rPr lang="en-US" smtClean="0"/>
-              <a:t>3/27/25</a:t>
+              <a:t>3/28/25</a:t>
             </a:fld>
             <a:endParaRPr lang="en-US"/>
           </a:p>
@@ -12956,7 +13572,7 @@
           <a:p>
             <a:fld id="{50BA65D8-0540-4835-AE5C-25D29DBA01BE}" type="datetime1">
               <a:rPr lang="en-US" smtClean="0"/>
-              <a:t>3/27/25</a:t>
+              <a:t>3/28/25</a:t>
             </a:fld>
             <a:endParaRPr lang="en-US"/>
           </a:p>
@@ -13198,7 +13814,7 @@
           <a:p>
             <a:fld id="{E31BA835-12AC-4E8F-955A-EA3F4DE2791F}" type="datetime1">
               <a:rPr lang="en-US" smtClean="0"/>
-              <a:t>3/27/25</a:t>
+              <a:t>3/28/25</a:t>
             </a:fld>
             <a:endParaRPr lang="en-US"/>
           </a:p>
@@ -13991,6 +14607,537 @@
           <p:cNvPr id="2" name="Title 1">
             <a:extLst>
               <a:ext uri="{FF2B5EF4-FFF2-40B4-BE49-F238E27FC236}">
+                <a16:creationId xmlns:a16="http://schemas.microsoft.com/office/drawing/2014/main" id="{99321B73-51D4-C468-9F86-15EECB9B6118}"/>
+              </a:ext>
+            </a:extLst>
+          </p:cNvPr>
+          <p:cNvSpPr>
+            <a:spLocks noGrp="1"/>
+          </p:cNvSpPr>
+          <p:nvPr>
+            <p:ph type="title"/>
+          </p:nvPr>
+        </p:nvSpPr>
+        <p:spPr/>
+        <p:txBody>
+          <a:bodyPr>
+            <a:normAutofit/>
+          </a:bodyPr>
+          <a:lstStyle/>
+          <a:p>
+            <a:r>
+              <a:rPr lang="en-US" altLang="zh-TW" dirty="0"/>
+              <a:t>Pre-processing	</a:t>
+            </a:r>
+            <a:endParaRPr lang="en-US" dirty="0"/>
+          </a:p>
+        </p:txBody>
+      </p:sp>
+      <p:sp>
+        <p:nvSpPr>
+          <p:cNvPr id="3" name="Content Placeholder 2">
+            <a:extLst>
+              <a:ext uri="{FF2B5EF4-FFF2-40B4-BE49-F238E27FC236}">
+                <a16:creationId xmlns:a16="http://schemas.microsoft.com/office/drawing/2014/main" id="{011EE8CF-EB87-1112-5C31-507CDCE0DCE1}"/>
+              </a:ext>
+            </a:extLst>
+          </p:cNvPr>
+          <p:cNvSpPr>
+            <a:spLocks noGrp="1"/>
+          </p:cNvSpPr>
+          <p:nvPr>
+            <p:ph idx="1"/>
+          </p:nvPr>
+        </p:nvSpPr>
+        <p:spPr>
+          <a:xfrm>
+            <a:off x="700635" y="2240715"/>
+            <a:ext cx="10691265" cy="3739896"/>
+          </a:xfrm>
+        </p:spPr>
+        <p:txBody>
+          <a:bodyPr/>
+          <a:lstStyle/>
+          <a:p>
+            <a:pPr>
+              <a:lnSpc>
+                <a:spcPct val="100000"/>
+              </a:lnSpc>
+            </a:pPr>
+            <a:r>
+              <a:rPr lang="en-US" sz="1600" b="1" dirty="0">
+                <a:effectLst/>
+                <a:latin typeface="Arial" panose="020B0604020202020204" pitchFamily="34" charset="0"/>
+                <a:cs typeface="Arial" panose="020B0604020202020204" pitchFamily="34" charset="0"/>
+              </a:rPr>
+              <a:t>Outlier Detection </a:t>
+            </a:r>
+          </a:p>
+          <a:p>
+            <a:pPr lvl="1">
+              <a:lnSpc>
+                <a:spcPct val="100000"/>
+              </a:lnSpc>
+            </a:pPr>
+            <a:r>
+              <a:rPr lang="en-US" altLang="zh-TW" sz="1600" dirty="0">
+                <a:effectLst/>
+                <a:latin typeface="Arial" panose="020B0604020202020204" pitchFamily="34" charset="0"/>
+                <a:cs typeface="Arial" panose="020B0604020202020204" pitchFamily="34" charset="0"/>
+              </a:rPr>
+              <a:t>Defin</a:t>
+            </a:r>
+            <a:r>
+              <a:rPr lang="en-US" altLang="zh-TW" sz="1600" dirty="0">
+                <a:latin typeface="Arial" panose="020B0604020202020204" pitchFamily="34" charset="0"/>
+                <a:cs typeface="Arial" panose="020B0604020202020204" pitchFamily="34" charset="0"/>
+              </a:rPr>
+              <a:t>e</a:t>
+            </a:r>
+            <a:r>
+              <a:rPr lang="zh-TW" altLang="en-US" sz="1600" dirty="0">
+                <a:latin typeface="Arial" panose="020B0604020202020204" pitchFamily="34" charset="0"/>
+                <a:cs typeface="Arial" panose="020B0604020202020204" pitchFamily="34" charset="0"/>
+              </a:rPr>
+              <a:t> </a:t>
+            </a:r>
+            <a:r>
+              <a:rPr lang="en-US" altLang="zh-TW" sz="1600" dirty="0">
+                <a:latin typeface="Arial" panose="020B0604020202020204" pitchFamily="34" charset="0"/>
+                <a:cs typeface="Arial" panose="020B0604020202020204" pitchFamily="34" charset="0"/>
+              </a:rPr>
+              <a:t>the</a:t>
+            </a:r>
+            <a:r>
+              <a:rPr lang="zh-TW" altLang="en-US" sz="1600" dirty="0">
+                <a:latin typeface="Arial" panose="020B0604020202020204" pitchFamily="34" charset="0"/>
+                <a:cs typeface="Arial" panose="020B0604020202020204" pitchFamily="34" charset="0"/>
+              </a:rPr>
+              <a:t> </a:t>
+            </a:r>
+            <a:r>
+              <a:rPr lang="en-US" altLang="zh-TW" sz="1600" dirty="0">
+                <a:latin typeface="Arial" panose="020B0604020202020204" pitchFamily="34" charset="0"/>
+                <a:cs typeface="Arial" panose="020B0604020202020204" pitchFamily="34" charset="0"/>
+              </a:rPr>
+              <a:t>price</a:t>
+            </a:r>
+            <a:r>
+              <a:rPr lang="zh-TW" altLang="en-US" sz="1600" dirty="0">
+                <a:latin typeface="Arial" panose="020B0604020202020204" pitchFamily="34" charset="0"/>
+                <a:cs typeface="Arial" panose="020B0604020202020204" pitchFamily="34" charset="0"/>
+              </a:rPr>
+              <a:t> </a:t>
+            </a:r>
+            <a:r>
+              <a:rPr lang="en-US" altLang="zh-TW" sz="1600" dirty="0">
+                <a:latin typeface="Arial" panose="020B0604020202020204" pitchFamily="34" charset="0"/>
+                <a:cs typeface="Arial" panose="020B0604020202020204" pitchFamily="34" charset="0"/>
+              </a:rPr>
+              <a:t>over</a:t>
+            </a:r>
+            <a:r>
+              <a:rPr lang="zh-TW" altLang="en-US" sz="1600" dirty="0">
+                <a:latin typeface="Arial" panose="020B0604020202020204" pitchFamily="34" charset="0"/>
+                <a:cs typeface="Arial" panose="020B0604020202020204" pitchFamily="34" charset="0"/>
+              </a:rPr>
+              <a:t> </a:t>
+            </a:r>
+            <a:r>
+              <a:rPr lang="en-US" altLang="zh-TW" sz="1600" dirty="0">
+                <a:latin typeface="Arial" panose="020B0604020202020204" pitchFamily="34" charset="0"/>
+                <a:cs typeface="Arial" panose="020B0604020202020204" pitchFamily="34" charset="0"/>
+              </a:rPr>
+              <a:t>1.5</a:t>
+            </a:r>
+            <a:r>
+              <a:rPr lang="zh-TW" altLang="en-US" sz="1600" dirty="0">
+                <a:latin typeface="Arial" panose="020B0604020202020204" pitchFamily="34" charset="0"/>
+                <a:cs typeface="Arial" panose="020B0604020202020204" pitchFamily="34" charset="0"/>
+              </a:rPr>
+              <a:t>* </a:t>
+            </a:r>
+            <a:r>
+              <a:rPr lang="en-US" altLang="zh-TW" sz="1600" dirty="0">
+                <a:latin typeface="Arial" panose="020B0604020202020204" pitchFamily="34" charset="0"/>
+                <a:cs typeface="Arial" panose="020B0604020202020204" pitchFamily="34" charset="0"/>
+              </a:rPr>
+              <a:t>IQR</a:t>
+            </a:r>
+            <a:r>
+              <a:rPr lang="zh-TW" altLang="en-US" sz="1600" dirty="0">
+                <a:latin typeface="Arial" panose="020B0604020202020204" pitchFamily="34" charset="0"/>
+                <a:cs typeface="Arial" panose="020B0604020202020204" pitchFamily="34" charset="0"/>
+              </a:rPr>
+              <a:t> </a:t>
+            </a:r>
+            <a:r>
+              <a:rPr lang="en-US" altLang="zh-TW" sz="1600" dirty="0">
+                <a:latin typeface="Arial" panose="020B0604020202020204" pitchFamily="34" charset="0"/>
+                <a:cs typeface="Arial" panose="020B0604020202020204" pitchFamily="34" charset="0"/>
+              </a:rPr>
+              <a:t>as</a:t>
+            </a:r>
+            <a:r>
+              <a:rPr lang="zh-TW" altLang="en-US" sz="1600" dirty="0">
+                <a:latin typeface="Arial" panose="020B0604020202020204" pitchFamily="34" charset="0"/>
+                <a:cs typeface="Arial" panose="020B0604020202020204" pitchFamily="34" charset="0"/>
+              </a:rPr>
+              <a:t> </a:t>
+            </a:r>
+            <a:r>
+              <a:rPr lang="en-US" altLang="zh-TW" sz="1600" dirty="0">
+                <a:latin typeface="Arial" panose="020B0604020202020204" pitchFamily="34" charset="0"/>
+                <a:cs typeface="Arial" panose="020B0604020202020204" pitchFamily="34" charset="0"/>
+              </a:rPr>
+              <a:t>outliers</a:t>
+            </a:r>
+          </a:p>
+          <a:p>
+            <a:pPr lvl="1">
+              <a:lnSpc>
+                <a:spcPct val="100000"/>
+              </a:lnSpc>
+            </a:pPr>
+            <a:r>
+              <a:rPr lang="en-US" altLang="zh-TW" sz="1600" dirty="0">
+                <a:latin typeface="Arial" panose="020B0604020202020204" pitchFamily="34" charset="0"/>
+                <a:cs typeface="Arial" panose="020B0604020202020204" pitchFamily="34" charset="0"/>
+              </a:rPr>
+              <a:t>Deal</a:t>
+            </a:r>
+            <a:r>
+              <a:rPr lang="zh-TW" altLang="en-US" sz="1600" dirty="0">
+                <a:latin typeface="Arial" panose="020B0604020202020204" pitchFamily="34" charset="0"/>
+                <a:cs typeface="Arial" panose="020B0604020202020204" pitchFamily="34" charset="0"/>
+              </a:rPr>
+              <a:t> </a:t>
+            </a:r>
+            <a:r>
+              <a:rPr lang="en-US" altLang="zh-TW" sz="1600" dirty="0">
+                <a:latin typeface="Arial" panose="020B0604020202020204" pitchFamily="34" charset="0"/>
+                <a:cs typeface="Arial" panose="020B0604020202020204" pitchFamily="34" charset="0"/>
+              </a:rPr>
+              <a:t>with</a:t>
+            </a:r>
+            <a:r>
+              <a:rPr lang="zh-TW" altLang="en-US" sz="1600" dirty="0">
+                <a:latin typeface="Arial" panose="020B0604020202020204" pitchFamily="34" charset="0"/>
+                <a:cs typeface="Arial" panose="020B0604020202020204" pitchFamily="34" charset="0"/>
+              </a:rPr>
+              <a:t> </a:t>
+            </a:r>
+            <a:r>
+              <a:rPr lang="en-US" altLang="zh-TW" sz="1600" dirty="0">
+                <a:latin typeface="Arial" panose="020B0604020202020204" pitchFamily="34" charset="0"/>
+                <a:cs typeface="Arial" panose="020B0604020202020204" pitchFamily="34" charset="0"/>
+              </a:rPr>
+              <a:t>outliers</a:t>
+            </a:r>
+          </a:p>
+          <a:p>
+            <a:pPr lvl="1">
+              <a:lnSpc>
+                <a:spcPct val="100000"/>
+              </a:lnSpc>
+            </a:pPr>
+            <a:endParaRPr lang="en-US" sz="1600" dirty="0">
+              <a:effectLst/>
+              <a:latin typeface="Arial" panose="020B0604020202020204" pitchFamily="34" charset="0"/>
+              <a:cs typeface="Arial" panose="020B0604020202020204" pitchFamily="34" charset="0"/>
+            </a:endParaRPr>
+          </a:p>
+          <a:p>
+            <a:pPr>
+              <a:lnSpc>
+                <a:spcPct val="100000"/>
+              </a:lnSpc>
+            </a:pPr>
+            <a:r>
+              <a:rPr lang="en-US" sz="1600" b="1" dirty="0">
+                <a:effectLst/>
+                <a:latin typeface="Arial" panose="020B0604020202020204" pitchFamily="34" charset="0"/>
+                <a:cs typeface="Arial" panose="020B0604020202020204" pitchFamily="34" charset="0"/>
+              </a:rPr>
+              <a:t>Feature Scaling </a:t>
+            </a:r>
+          </a:p>
+          <a:p>
+            <a:pPr lvl="1">
+              <a:lnSpc>
+                <a:spcPct val="100000"/>
+              </a:lnSpc>
+            </a:pPr>
+            <a:r>
+              <a:rPr lang="en-US" altLang="zh-TW" sz="1600" dirty="0">
+                <a:latin typeface="Arial" panose="020B0604020202020204" pitchFamily="34" charset="0"/>
+                <a:cs typeface="Arial" panose="020B0604020202020204" pitchFamily="34" charset="0"/>
+              </a:rPr>
+              <a:t>Normalization</a:t>
+            </a:r>
+            <a:r>
+              <a:rPr lang="zh-TW" altLang="en-US" sz="1600" dirty="0">
+                <a:latin typeface="Arial" panose="020B0604020202020204" pitchFamily="34" charset="0"/>
+                <a:cs typeface="Arial" panose="020B0604020202020204" pitchFamily="34" charset="0"/>
+              </a:rPr>
+              <a:t> </a:t>
+            </a:r>
+            <a:r>
+              <a:rPr lang="en-US" altLang="zh-TW" sz="1600" dirty="0">
+                <a:latin typeface="Arial" panose="020B0604020202020204" pitchFamily="34" charset="0"/>
+                <a:cs typeface="Arial" panose="020B0604020202020204" pitchFamily="34" charset="0"/>
+              </a:rPr>
+              <a:t>the</a:t>
+            </a:r>
+            <a:r>
+              <a:rPr lang="zh-TW" altLang="en-US" sz="1600" dirty="0">
+                <a:latin typeface="Arial" panose="020B0604020202020204" pitchFamily="34" charset="0"/>
+                <a:cs typeface="Arial" panose="020B0604020202020204" pitchFamily="34" charset="0"/>
+              </a:rPr>
+              <a:t> </a:t>
+            </a:r>
+            <a:r>
+              <a:rPr lang="en-US" altLang="zh-TW" sz="1600" dirty="0">
+                <a:latin typeface="Arial" panose="020B0604020202020204" pitchFamily="34" charset="0"/>
+                <a:cs typeface="Arial" panose="020B0604020202020204" pitchFamily="34" charset="0"/>
+              </a:rPr>
+              <a:t>features</a:t>
+            </a:r>
+            <a:r>
+              <a:rPr lang="zh-TW" altLang="en-US" sz="1600" dirty="0">
+                <a:latin typeface="Arial" panose="020B0604020202020204" pitchFamily="34" charset="0"/>
+                <a:cs typeface="Arial" panose="020B0604020202020204" pitchFamily="34" charset="0"/>
+              </a:rPr>
+              <a:t> </a:t>
+            </a:r>
+            <a:r>
+              <a:rPr lang="en-US" altLang="zh-TW" sz="1600" dirty="0">
+                <a:latin typeface="Arial" panose="020B0604020202020204" pitchFamily="34" charset="0"/>
+                <a:cs typeface="Arial" panose="020B0604020202020204" pitchFamily="34" charset="0"/>
+              </a:rPr>
+              <a:t>as</a:t>
+            </a:r>
+            <a:r>
+              <a:rPr lang="zh-TW" altLang="en-US" sz="1600" dirty="0">
+                <a:latin typeface="Arial" panose="020B0604020202020204" pitchFamily="34" charset="0"/>
+                <a:cs typeface="Arial" panose="020B0604020202020204" pitchFamily="34" charset="0"/>
+              </a:rPr>
+              <a:t> </a:t>
+            </a:r>
+            <a:r>
+              <a:rPr lang="en-US" altLang="zh-TW" sz="1600" dirty="0">
+                <a:latin typeface="Arial" panose="020B0604020202020204" pitchFamily="34" charset="0"/>
+                <a:cs typeface="Arial" panose="020B0604020202020204" pitchFamily="34" charset="0"/>
+              </a:rPr>
+              <a:t>Standard</a:t>
+            </a:r>
+            <a:r>
+              <a:rPr lang="zh-TW" altLang="en-US" sz="1600" dirty="0">
+                <a:latin typeface="Arial" panose="020B0604020202020204" pitchFamily="34" charset="0"/>
+                <a:cs typeface="Arial" panose="020B0604020202020204" pitchFamily="34" charset="0"/>
+              </a:rPr>
+              <a:t> </a:t>
+            </a:r>
+            <a:r>
+              <a:rPr lang="en-US" altLang="zh-TW" sz="1600" dirty="0">
+                <a:latin typeface="Arial" panose="020B0604020202020204" pitchFamily="34" charset="0"/>
+                <a:cs typeface="Arial" panose="020B0604020202020204" pitchFamily="34" charset="0"/>
+              </a:rPr>
+              <a:t>Scales</a:t>
+            </a:r>
+          </a:p>
+          <a:p>
+            <a:pPr lvl="1">
+              <a:lnSpc>
+                <a:spcPct val="100000"/>
+              </a:lnSpc>
+            </a:pPr>
+            <a:endParaRPr lang="en-US" altLang="zh-TW" sz="1600" dirty="0">
+              <a:latin typeface="Arial" panose="020B0604020202020204" pitchFamily="34" charset="0"/>
+              <a:cs typeface="Arial" panose="020B0604020202020204" pitchFamily="34" charset="0"/>
+            </a:endParaRPr>
+          </a:p>
+          <a:p>
+            <a:pPr marL="228600" lvl="1">
+              <a:lnSpc>
+                <a:spcPct val="100000"/>
+              </a:lnSpc>
+              <a:spcBef>
+                <a:spcPts val="1000"/>
+              </a:spcBef>
+            </a:pPr>
+            <a:r>
+              <a:rPr lang="en-US" altLang="zh-TW" sz="1600" b="1" dirty="0">
+                <a:latin typeface="Arial" panose="020B0604020202020204" pitchFamily="34" charset="0"/>
+                <a:cs typeface="Arial" panose="020B0604020202020204" pitchFamily="34" charset="0"/>
+              </a:rPr>
+              <a:t>Splitting</a:t>
+            </a:r>
+            <a:r>
+              <a:rPr lang="zh-TW" altLang="en-US" sz="1600" b="1" dirty="0">
+                <a:latin typeface="Arial" panose="020B0604020202020204" pitchFamily="34" charset="0"/>
+                <a:cs typeface="Arial" panose="020B0604020202020204" pitchFamily="34" charset="0"/>
+              </a:rPr>
+              <a:t> </a:t>
+            </a:r>
+            <a:r>
+              <a:rPr lang="en-US" altLang="zh-TW" sz="1600" b="1" dirty="0">
+                <a:latin typeface="Arial" panose="020B0604020202020204" pitchFamily="34" charset="0"/>
+                <a:cs typeface="Arial" panose="020B0604020202020204" pitchFamily="34" charset="0"/>
+              </a:rPr>
+              <a:t>dataset</a:t>
+            </a:r>
+          </a:p>
+          <a:p>
+            <a:pPr lvl="1">
+              <a:lnSpc>
+                <a:spcPct val="100000"/>
+              </a:lnSpc>
+            </a:pPr>
+            <a:r>
+              <a:rPr lang="en-US" altLang="zh-TW" sz="1600" dirty="0">
+                <a:latin typeface="Arial" panose="020B0604020202020204" pitchFamily="34" charset="0"/>
+                <a:cs typeface="Arial" panose="020B0604020202020204" pitchFamily="34" charset="0"/>
+              </a:rPr>
+              <a:t>Splitting</a:t>
+            </a:r>
+            <a:r>
+              <a:rPr lang="zh-TW" altLang="en-US" sz="1600" dirty="0">
+                <a:latin typeface="Arial" panose="020B0604020202020204" pitchFamily="34" charset="0"/>
+                <a:cs typeface="Arial" panose="020B0604020202020204" pitchFamily="34" charset="0"/>
+              </a:rPr>
+              <a:t> </a:t>
+            </a:r>
+            <a:r>
+              <a:rPr lang="en-US" altLang="zh-TW" sz="1600" dirty="0">
+                <a:latin typeface="Arial" panose="020B0604020202020204" pitchFamily="34" charset="0"/>
+                <a:cs typeface="Arial" panose="020B0604020202020204" pitchFamily="34" charset="0"/>
+              </a:rPr>
+              <a:t>dataset</a:t>
+            </a:r>
+            <a:r>
+              <a:rPr lang="zh-TW" altLang="en-US" sz="1600" dirty="0">
+                <a:latin typeface="Arial" panose="020B0604020202020204" pitchFamily="34" charset="0"/>
+                <a:cs typeface="Arial" panose="020B0604020202020204" pitchFamily="34" charset="0"/>
+              </a:rPr>
+              <a:t> </a:t>
+            </a:r>
+            <a:r>
+              <a:rPr lang="en-US" altLang="zh-TW" sz="1600" dirty="0">
+                <a:latin typeface="Arial" panose="020B0604020202020204" pitchFamily="34" charset="0"/>
+                <a:cs typeface="Arial" panose="020B0604020202020204" pitchFamily="34" charset="0"/>
+              </a:rPr>
+              <a:t>for</a:t>
+            </a:r>
+            <a:r>
+              <a:rPr lang="zh-TW" altLang="en-US" sz="1600" dirty="0">
+                <a:latin typeface="Arial" panose="020B0604020202020204" pitchFamily="34" charset="0"/>
+                <a:cs typeface="Arial" panose="020B0604020202020204" pitchFamily="34" charset="0"/>
+              </a:rPr>
+              <a:t> </a:t>
+            </a:r>
+            <a:r>
+              <a:rPr lang="en-US" altLang="zh-TW" sz="1600" dirty="0">
+                <a:latin typeface="Arial" panose="020B0604020202020204" pitchFamily="34" charset="0"/>
+                <a:cs typeface="Arial" panose="020B0604020202020204" pitchFamily="34" charset="0"/>
+              </a:rPr>
+              <a:t>training</a:t>
+            </a:r>
+            <a:r>
+              <a:rPr lang="zh-TW" altLang="en-US" sz="1600" dirty="0">
+                <a:latin typeface="Arial" panose="020B0604020202020204" pitchFamily="34" charset="0"/>
+                <a:cs typeface="Arial" panose="020B0604020202020204" pitchFamily="34" charset="0"/>
+              </a:rPr>
+              <a:t> </a:t>
+            </a:r>
+            <a:r>
+              <a:rPr lang="en-US" altLang="zh-TW" sz="1600" dirty="0">
+                <a:latin typeface="Arial" panose="020B0604020202020204" pitchFamily="34" charset="0"/>
+                <a:cs typeface="Arial" panose="020B0604020202020204" pitchFamily="34" charset="0"/>
+              </a:rPr>
+              <a:t>/</a:t>
+            </a:r>
+            <a:r>
+              <a:rPr lang="zh-TW" altLang="en-US" sz="1600" dirty="0">
+                <a:latin typeface="Arial" panose="020B0604020202020204" pitchFamily="34" charset="0"/>
+                <a:cs typeface="Arial" panose="020B0604020202020204" pitchFamily="34" charset="0"/>
+              </a:rPr>
+              <a:t> </a:t>
+            </a:r>
+            <a:r>
+              <a:rPr lang="en-US" altLang="zh-TW" sz="1600" dirty="0">
+                <a:latin typeface="Arial" panose="020B0604020202020204" pitchFamily="34" charset="0"/>
+                <a:cs typeface="Arial" panose="020B0604020202020204" pitchFamily="34" charset="0"/>
+              </a:rPr>
+              <a:t>testing</a:t>
+            </a:r>
+            <a:r>
+              <a:rPr lang="zh-TW" altLang="en-US" sz="1600" dirty="0">
+                <a:latin typeface="Arial" panose="020B0604020202020204" pitchFamily="34" charset="0"/>
+                <a:cs typeface="Arial" panose="020B0604020202020204" pitchFamily="34" charset="0"/>
+              </a:rPr>
+              <a:t> </a:t>
+            </a:r>
+            <a:r>
+              <a:rPr lang="en-US" altLang="zh-TW" sz="1600" dirty="0">
+                <a:latin typeface="Arial" panose="020B0604020202020204" pitchFamily="34" charset="0"/>
+                <a:cs typeface="Arial" panose="020B0604020202020204" pitchFamily="34" charset="0"/>
+              </a:rPr>
+              <a:t>dataset(80/20)</a:t>
+            </a:r>
+          </a:p>
+          <a:p>
+            <a:pPr lvl="1">
+              <a:lnSpc>
+                <a:spcPct val="100000"/>
+              </a:lnSpc>
+            </a:pPr>
+            <a:endParaRPr lang="en-US" sz="1600" dirty="0">
+              <a:effectLst/>
+              <a:latin typeface="Arial" panose="020B0604020202020204" pitchFamily="34" charset="0"/>
+              <a:cs typeface="Arial" panose="020B0604020202020204" pitchFamily="34" charset="0"/>
+            </a:endParaRPr>
+          </a:p>
+          <a:p>
+            <a:endParaRPr lang="en-US" dirty="0"/>
+          </a:p>
+        </p:txBody>
+      </p:sp>
+    </p:spTree>
+    <p:extLst>
+      <p:ext uri="{BB962C8B-B14F-4D97-AF65-F5344CB8AC3E}">
+        <p14:creationId xmlns:p14="http://schemas.microsoft.com/office/powerpoint/2010/main" val="1304513926"/>
+      </p:ext>
+    </p:extLst>
+  </p:cSld>
+  <p:clrMapOvr>
+    <a:masterClrMapping/>
+  </p:clrMapOvr>
+</p:sld>
+</file>
+
+<file path=ppt/slides/slide11.xml><?xml version="1.0" encoding="utf-8"?>
+<p:sld xmlns:a="http://schemas.openxmlformats.org/drawingml/2006/main" xmlns:r="http://schemas.openxmlformats.org/officeDocument/2006/relationships" xmlns:p="http://schemas.openxmlformats.org/presentationml/2006/main">
+  <p:cSld>
+    <p:spTree>
+      <p:nvGrpSpPr>
+        <p:cNvPr id="1" name=""/>
+        <p:cNvGrpSpPr/>
+        <p:nvPr/>
+      </p:nvGrpSpPr>
+      <p:grpSpPr>
+        <a:xfrm>
+          <a:off x="0" y="0"/>
+          <a:ext cx="0" cy="0"/>
+          <a:chOff x="0" y="0"/>
+          <a:chExt cx="0" cy="0"/>
+        </a:xfrm>
+      </p:grpSpPr>
+      <p:sp>
+        <p:nvSpPr>
+          <p:cNvPr id="2" name="Title 1">
+            <a:extLst>
+              <a:ext uri="{FF2B5EF4-FFF2-40B4-BE49-F238E27FC236}">
                 <a16:creationId xmlns:a16="http://schemas.microsoft.com/office/drawing/2014/main" id="{8C514191-76C9-4321-C470-BB84EB323C18}"/>
               </a:ext>
             </a:extLst>
@@ -14366,7 +15513,7 @@
 </p:sld>
 </file>
 
-<file path=ppt/slides/slide11.xml><?xml version="1.0" encoding="utf-8"?>
+<file path=ppt/slides/slide12.xml><?xml version="1.0" encoding="utf-8"?>
 <p:sld xmlns:a="http://schemas.openxmlformats.org/drawingml/2006/main" xmlns:r="http://schemas.openxmlformats.org/officeDocument/2006/relationships" xmlns:p="http://schemas.openxmlformats.org/presentationml/2006/main">
   <p:cSld>
     <p:spTree>
@@ -14429,7 +15576,7 @@
             <p:ph idx="1"/>
             <p:extLst>
               <p:ext uri="{D42A27DB-BD31-4B8C-83A1-F6EECF244321}">
-                <p14:modId xmlns:p14="http://schemas.microsoft.com/office/powerpoint/2010/main" val="3651526393"/>
+                <p14:modId xmlns:p14="http://schemas.microsoft.com/office/powerpoint/2010/main" val="329251114"/>
               </p:ext>
             </p:extLst>
           </p:nvPr>
@@ -14654,7 +15801,43 @@
                           <a:ea typeface="+mn-ea"/>
                           <a:cs typeface="Arial" panose="020B0604020202020204" pitchFamily="34" charset="0"/>
                         </a:rPr>
-                        <a:t>Ridge Regression </a:t>
+                        <a:t>Ridge </a:t>
+                      </a:r>
+                      <a:r>
+                        <a:rPr lang="en-US" altLang="zh-TW" sz="1800" kern="1200" dirty="0">
+                          <a:solidFill>
+                            <a:schemeClr val="dk1"/>
+                          </a:solidFill>
+                          <a:effectLst/>
+                          <a:latin typeface="Arial" panose="020B0604020202020204" pitchFamily="34" charset="0"/>
+                          <a:ea typeface="+mn-ea"/>
+                          <a:cs typeface="Arial" panose="020B0604020202020204" pitchFamily="34" charset="0"/>
+                        </a:rPr>
+                        <a:t>linear</a:t>
+                      </a:r>
+                      <a:r>
+                        <a:rPr lang="zh-TW" altLang="en-US" sz="1800" kern="1200" dirty="0">
+                          <a:solidFill>
+                            <a:schemeClr val="dk1"/>
+                          </a:solidFill>
+                          <a:effectLst/>
+                          <a:latin typeface="Arial" panose="020B0604020202020204" pitchFamily="34" charset="0"/>
+                          <a:ea typeface="+mn-ea"/>
+                          <a:cs typeface="Arial" panose="020B0604020202020204" pitchFamily="34" charset="0"/>
+                        </a:rPr>
+                        <a:t> </a:t>
+                      </a:r>
+                      <a:r>
+                        <a:rPr lang="en-US" sz="1800" kern="1200" dirty="0">
+                          <a:solidFill>
+                            <a:schemeClr val="dk1"/>
+                          </a:solidFill>
+                          <a:effectLst/>
+                          <a:latin typeface="Arial" panose="020B0604020202020204" pitchFamily="34" charset="0"/>
+                          <a:ea typeface="+mn-ea"/>
+                          <a:cs typeface="Arial" panose="020B0604020202020204" pitchFamily="34" charset="0"/>
+                        </a:rPr>
+                        <a:t>Regression </a:t>
                       </a:r>
                       <a:endParaRPr lang="en-US" dirty="0">
                         <a:latin typeface="Arial" panose="020B0604020202020204" pitchFamily="34" charset="0"/>
@@ -15256,7 +16439,7 @@
 </p:sld>
 </file>
 
-<file path=ppt/slides/slide12.xml><?xml version="1.0" encoding="utf-8"?>
+<file path=ppt/slides/slide13.xml><?xml version="1.0" encoding="utf-8"?>
 <p:sld xmlns:a="http://schemas.openxmlformats.org/drawingml/2006/main" xmlns:r="http://schemas.openxmlformats.org/officeDocument/2006/relationships" xmlns:p="http://schemas.openxmlformats.org/presentationml/2006/main">
   <p:cSld>
     <p:bg>
@@ -15541,7 +16724,31 @@
                 <a:latin typeface="Arial" panose="020B0604020202020204" pitchFamily="34" charset="0"/>
                 <a:cs typeface="Arial" panose="020B0604020202020204" pitchFamily="34" charset="0"/>
               </a:rPr>
-              <a:t> model and see their feature importance. The top 5 features in both models are the same, though they are in a different order.</a:t>
+              <a:t> model and see their feature importance. The top 5 features</a:t>
+            </a:r>
+            <a:r>
+              <a:rPr lang="zh-TW" altLang="en-US" b="0" i="0" dirty="0">
+                <a:effectLst/>
+                <a:latin typeface="Arial" panose="020B0604020202020204" pitchFamily="34" charset="0"/>
+                <a:cs typeface="Arial" panose="020B0604020202020204" pitchFamily="34" charset="0"/>
+              </a:rPr>
+              <a:t> </a:t>
+            </a:r>
+            <a:r>
+              <a:rPr lang="en-US" altLang="zh-TW" b="0" i="0" dirty="0">
+                <a:effectLst/>
+                <a:latin typeface="Arial" panose="020B0604020202020204" pitchFamily="34" charset="0"/>
+                <a:cs typeface="Arial" panose="020B0604020202020204" pitchFamily="34" charset="0"/>
+              </a:rPr>
+              <a:t>importance</a:t>
+            </a:r>
+            <a:r>
+              <a:rPr lang="en-US" b="0" i="0" dirty="0">
+                <a:effectLst/>
+                <a:latin typeface="Arial" panose="020B0604020202020204" pitchFamily="34" charset="0"/>
+                <a:cs typeface="Arial" panose="020B0604020202020204" pitchFamily="34" charset="0"/>
+              </a:rPr>
+              <a:t> in both models are the same, though they are in a different order.</a:t>
             </a:r>
             <a:endParaRPr lang="en-US" dirty="0">
               <a:latin typeface="Arial" panose="020B0604020202020204" pitchFamily="34" charset="0"/>
@@ -15581,6 +16788,63 @@
           </a:prstGeom>
         </p:spPr>
       </p:pic>
+      <p:sp>
+        <p:nvSpPr>
+          <p:cNvPr id="3" name="Rectangle 2">
+            <a:extLst>
+              <a:ext uri="{FF2B5EF4-FFF2-40B4-BE49-F238E27FC236}">
+                <a16:creationId xmlns:a16="http://schemas.microsoft.com/office/drawing/2014/main" id="{A06B7EAF-3A7E-6CD1-DCAA-F7424177EC7C}"/>
+              </a:ext>
+            </a:extLst>
+          </p:cNvPr>
+          <p:cNvSpPr/>
+          <p:nvPr/>
+        </p:nvSpPr>
+        <p:spPr>
+          <a:xfrm>
+            <a:off x="6357257" y="1079862"/>
+            <a:ext cx="5347062" cy="3709851"/>
+          </a:xfrm>
+          <a:prstGeom prst="rect">
+            <a:avLst/>
+          </a:prstGeom>
+          <a:noFill/>
+          <a:ln w="12700" cap="flat" cmpd="sng" algn="ctr">
+            <a:solidFill>
+              <a:srgbClr val="FF0000"/>
+            </a:solidFill>
+            <a:prstDash val="solid"/>
+            <a:miter lim="800000"/>
+          </a:ln>
+          <a:effectLst/>
+        </p:spPr>
+        <p:style>
+          <a:lnRef idx="2">
+            <a:schemeClr val="accent1">
+              <a:shade val="50000"/>
+            </a:schemeClr>
+          </a:lnRef>
+          <a:fillRef idx="1">
+            <a:schemeClr val="accent1"/>
+          </a:fillRef>
+          <a:effectRef idx="0">
+            <a:schemeClr val="accent1"/>
+          </a:effectRef>
+          <a:fontRef idx="minor">
+            <a:schemeClr val="lt1"/>
+          </a:fontRef>
+        </p:style>
+        <p:txBody>
+          <a:bodyPr rtlCol="0" anchor="ctr"/>
+          <a:lstStyle/>
+          <a:p>
+            <a:pPr algn="ctr"/>
+            <a:endParaRPr lang="en-US">
+              <a:noFill/>
+            </a:endParaRPr>
+          </a:p>
+        </p:txBody>
+      </p:sp>
     </p:spTree>
     <p:extLst>
       <p:ext uri="{BB962C8B-B14F-4D97-AF65-F5344CB8AC3E}">
@@ -15594,7 +16858,7 @@
 </p:sld>
 </file>
 
-<file path=ppt/slides/slide13.xml><?xml version="1.0" encoding="utf-8"?>
+<file path=ppt/slides/slide14.xml><?xml version="1.0" encoding="utf-8"?>
 <p:sld xmlns:a="http://schemas.openxmlformats.org/drawingml/2006/main" xmlns:r="http://schemas.openxmlformats.org/officeDocument/2006/relationships" xmlns:p="http://schemas.openxmlformats.org/presentationml/2006/main">
   <p:cSld>
     <p:spTree>
@@ -15658,7 +16922,7 @@
             <p:ph idx="1"/>
             <p:extLst>
               <p:ext uri="{D42A27DB-BD31-4B8C-83A1-F6EECF244321}">
-                <p14:modId xmlns:p14="http://schemas.microsoft.com/office/powerpoint/2010/main" val="3622019448"/>
+                <p14:modId xmlns:p14="http://schemas.microsoft.com/office/powerpoint/2010/main" val="672824203"/>
               </p:ext>
             </p:extLst>
           </p:nvPr>
@@ -15686,7 +16950,7 @@
 </p:sld>
 </file>
 
-<file path=ppt/slides/slide14.xml><?xml version="1.0" encoding="utf-8"?>
+<file path=ppt/slides/slide15.xml><?xml version="1.0" encoding="utf-8"?>
 <p:sld xmlns:a="http://schemas.openxmlformats.org/drawingml/2006/main" xmlns:r="http://schemas.openxmlformats.org/officeDocument/2006/relationships" xmlns:p="http://schemas.openxmlformats.org/presentationml/2006/main">
   <p:cSld>
     <p:spTree>
@@ -16135,7 +17399,7 @@
             <p:ph idx="1"/>
             <p:extLst>
               <p:ext uri="{D42A27DB-BD31-4B8C-83A1-F6EECF244321}">
-                <p14:modId xmlns:p14="http://schemas.microsoft.com/office/powerpoint/2010/main" val="3832222504"/>
+                <p14:modId xmlns:p14="http://schemas.microsoft.com/office/powerpoint/2010/main" val="1831188092"/>
               </p:ext>
             </p:extLst>
           </p:nvPr>
@@ -16901,8 +18165,31 @@
           <a:lstStyle/>
           <a:p>
             <a:r>
+              <a:rPr lang="en-US" altLang="zh-TW" b="1" dirty="0"/>
+              <a:t>Data</a:t>
+            </a:r>
+            <a:r>
+              <a:rPr lang="zh-TW" altLang="en-US" b="1" dirty="0"/>
+              <a:t> </a:t>
+            </a:r>
+            <a:r>
+              <a:rPr lang="en-US" altLang="zh-TW" b="1" dirty="0"/>
+              <a:t>Wrangling</a:t>
+            </a:r>
+            <a:br>
+              <a:rPr lang="en-US" altLang="zh-TW" b="1" dirty="0"/>
+            </a:br>
+            <a:r>
+              <a:rPr lang="en-US" altLang="zh-TW" b="1" dirty="0"/>
+              <a:t>Basic</a:t>
+            </a:r>
+            <a:r>
+              <a:rPr lang="zh-TW" altLang="en-US" b="1" dirty="0"/>
+              <a:t> </a:t>
+            </a:r>
+            <a:r>
               <a:rPr lang="en-US" b="1" dirty="0"/>
-              <a:t>Data Cleaning &amp; Preprocessing </a:t>
+              <a:t>Data Cleaning </a:t>
             </a:r>
           </a:p>
         </p:txBody>
@@ -16977,13 +18264,13 @@
         </p:nvSpPr>
         <p:spPr>
           <a:xfrm>
-            <a:off x="704088" y="2221992"/>
+            <a:off x="671913" y="2221990"/>
             <a:ext cx="6239599" cy="3941064"/>
           </a:xfrm>
         </p:spPr>
         <p:txBody>
           <a:bodyPr>
-            <a:normAutofit lnSpcReduction="10000"/>
+            <a:normAutofit/>
           </a:bodyPr>
           <a:lstStyle/>
           <a:p>
@@ -17178,31 +18465,143 @@
             </a:r>
           </a:p>
           <a:p>
-            <a:pPr marL="457200" lvl="1" indent="0">
+            <a:pPr lvl="1">
               <a:lnSpc>
                 <a:spcPct val="100000"/>
               </a:lnSpc>
-              <a:buNone/>
             </a:pPr>
-            <a:endParaRPr lang="en-US" sz="1600" dirty="0">
-              <a:effectLst/>
+            <a:endParaRPr lang="en-US" altLang="zh-TW" sz="1600" dirty="0">
               <a:latin typeface="Arial" panose="020B0604020202020204" pitchFamily="34" charset="0"/>
               <a:cs typeface="Arial" panose="020B0604020202020204" pitchFamily="34" charset="0"/>
             </a:endParaRPr>
           </a:p>
           <a:p>
-            <a:pPr>
+            <a:pPr marL="228600" lvl="1">
               <a:lnSpc>
                 <a:spcPct val="100000"/>
               </a:lnSpc>
+              <a:spcBef>
+                <a:spcPts val="1000"/>
+              </a:spcBef>
             </a:pPr>
             <a:r>
-              <a:rPr lang="en-US" sz="1600" b="1" dirty="0">
-                <a:effectLst/>
+              <a:rPr lang="en-US" altLang="zh-TW" sz="1600" b="1" dirty="0">
                 <a:latin typeface="Arial" panose="020B0604020202020204" pitchFamily="34" charset="0"/>
                 <a:cs typeface="Arial" panose="020B0604020202020204" pitchFamily="34" charset="0"/>
               </a:rPr>
-              <a:t>Outlier Detection </a:t>
+              <a:t>Deal</a:t>
+            </a:r>
+            <a:r>
+              <a:rPr lang="zh-TW" altLang="en-US" sz="1600" b="1" dirty="0">
+                <a:latin typeface="Arial" panose="020B0604020202020204" pitchFamily="34" charset="0"/>
+                <a:cs typeface="Arial" panose="020B0604020202020204" pitchFamily="34" charset="0"/>
+              </a:rPr>
+              <a:t> </a:t>
+            </a:r>
+            <a:r>
+              <a:rPr lang="en-US" altLang="zh-TW" sz="1600" b="1" dirty="0">
+                <a:latin typeface="Arial" panose="020B0604020202020204" pitchFamily="34" charset="0"/>
+                <a:cs typeface="Arial" panose="020B0604020202020204" pitchFamily="34" charset="0"/>
+              </a:rPr>
+              <a:t>with</a:t>
+            </a:r>
+            <a:r>
+              <a:rPr lang="zh-TW" altLang="en-US" sz="1600" b="1" dirty="0">
+                <a:latin typeface="Arial" panose="020B0604020202020204" pitchFamily="34" charset="0"/>
+                <a:cs typeface="Arial" panose="020B0604020202020204" pitchFamily="34" charset="0"/>
+              </a:rPr>
+              <a:t> </a:t>
+            </a:r>
+            <a:r>
+              <a:rPr lang="en-US" altLang="zh-TW" sz="1600" b="1" dirty="0">
+                <a:latin typeface="Arial" panose="020B0604020202020204" pitchFamily="34" charset="0"/>
+                <a:cs typeface="Arial" panose="020B0604020202020204" pitchFamily="34" charset="0"/>
+              </a:rPr>
+              <a:t>the</a:t>
+            </a:r>
+            <a:r>
+              <a:rPr lang="zh-TW" altLang="en-US" sz="1600" b="1" dirty="0">
+                <a:latin typeface="Arial" panose="020B0604020202020204" pitchFamily="34" charset="0"/>
+                <a:cs typeface="Arial" panose="020B0604020202020204" pitchFamily="34" charset="0"/>
+              </a:rPr>
+              <a:t> </a:t>
+            </a:r>
+            <a:r>
+              <a:rPr lang="en-US" altLang="zh-TW" sz="1600" b="1" dirty="0">
+                <a:latin typeface="Arial" panose="020B0604020202020204" pitchFamily="34" charset="0"/>
+                <a:cs typeface="Arial" panose="020B0604020202020204" pitchFamily="34" charset="0"/>
+              </a:rPr>
+              <a:t>coffee</a:t>
+            </a:r>
+            <a:r>
+              <a:rPr lang="zh-TW" altLang="en-US" sz="1600" b="1" dirty="0">
+                <a:latin typeface="Arial" panose="020B0604020202020204" pitchFamily="34" charset="0"/>
+                <a:cs typeface="Arial" panose="020B0604020202020204" pitchFamily="34" charset="0"/>
+              </a:rPr>
+              <a:t> </a:t>
+            </a:r>
+            <a:r>
+              <a:rPr lang="en-US" altLang="zh-TW" sz="1600" b="1" dirty="0">
+                <a:latin typeface="Arial" panose="020B0604020202020204" pitchFamily="34" charset="0"/>
+                <a:cs typeface="Arial" panose="020B0604020202020204" pitchFamily="34" charset="0"/>
+              </a:rPr>
+              <a:t>price</a:t>
+            </a:r>
+            <a:r>
+              <a:rPr lang="zh-TW" altLang="en-US" sz="1600" b="1" dirty="0">
+                <a:latin typeface="Arial" panose="020B0604020202020204" pitchFamily="34" charset="0"/>
+                <a:cs typeface="Arial" panose="020B0604020202020204" pitchFamily="34" charset="0"/>
+              </a:rPr>
+              <a:t> </a:t>
+            </a:r>
+            <a:r>
+              <a:rPr lang="en-US" altLang="zh-TW" sz="1600" b="1" dirty="0">
+                <a:latin typeface="Arial" panose="020B0604020202020204" pitchFamily="34" charset="0"/>
+                <a:cs typeface="Arial" panose="020B0604020202020204" pitchFamily="34" charset="0"/>
+              </a:rPr>
+              <a:t>in</a:t>
+            </a:r>
+            <a:r>
+              <a:rPr lang="zh-TW" altLang="en-US" sz="1600" b="1" dirty="0">
+                <a:latin typeface="Arial" panose="020B0604020202020204" pitchFamily="34" charset="0"/>
+                <a:cs typeface="Arial" panose="020B0604020202020204" pitchFamily="34" charset="0"/>
+              </a:rPr>
+              <a:t> </a:t>
+            </a:r>
+            <a:r>
+              <a:rPr lang="en-US" altLang="zh-TW" sz="1600" b="1" dirty="0">
+                <a:latin typeface="Arial" panose="020B0604020202020204" pitchFamily="34" charset="0"/>
+                <a:cs typeface="Arial" panose="020B0604020202020204" pitchFamily="34" charset="0"/>
+              </a:rPr>
+              <a:t>the</a:t>
+            </a:r>
+            <a:r>
+              <a:rPr lang="zh-TW" altLang="en-US" sz="1600" b="1" dirty="0">
+                <a:latin typeface="Arial" panose="020B0604020202020204" pitchFamily="34" charset="0"/>
+                <a:cs typeface="Arial" panose="020B0604020202020204" pitchFamily="34" charset="0"/>
+              </a:rPr>
+              <a:t> </a:t>
+            </a:r>
+            <a:r>
+              <a:rPr lang="en-US" altLang="zh-TW" sz="1600" b="1" dirty="0">
+                <a:latin typeface="Arial" panose="020B0604020202020204" pitchFamily="34" charset="0"/>
+                <a:cs typeface="Arial" panose="020B0604020202020204" pitchFamily="34" charset="0"/>
+              </a:rPr>
+              <a:t>same</a:t>
+            </a:r>
+            <a:r>
+              <a:rPr lang="zh-TW" altLang="en-US" sz="1600" b="1" dirty="0">
+                <a:latin typeface="Arial" panose="020B0604020202020204" pitchFamily="34" charset="0"/>
+                <a:cs typeface="Arial" panose="020B0604020202020204" pitchFamily="34" charset="0"/>
+              </a:rPr>
+              <a:t> </a:t>
+            </a:r>
+            <a:r>
+              <a:rPr lang="en-US" altLang="zh-TW" sz="1600" b="1" dirty="0">
+                <a:latin typeface="Arial" panose="020B0604020202020204" pitchFamily="34" charset="0"/>
+                <a:cs typeface="Arial" panose="020B0604020202020204" pitchFamily="34" charset="0"/>
+              </a:rPr>
+              <a:t>unit</a:t>
             </a:r>
           </a:p>
           <a:p>
@@ -17212,284 +18611,28 @@
               </a:lnSpc>
             </a:pPr>
             <a:r>
-              <a:rPr lang="en-US" altLang="zh-TW" sz="1600" dirty="0">
-                <a:effectLst/>
+              <a:rPr lang="en-US" sz="1600" dirty="0">
                 <a:latin typeface="Arial" panose="020B0604020202020204" pitchFamily="34" charset="0"/>
                 <a:cs typeface="Arial" panose="020B0604020202020204" pitchFamily="34" charset="0"/>
               </a:rPr>
-              <a:t>Defin</a:t>
-            </a:r>
-            <a:r>
-              <a:rPr lang="en-US" altLang="zh-TW" sz="1600" dirty="0">
-                <a:latin typeface="Arial" panose="020B0604020202020204" pitchFamily="34" charset="0"/>
-                <a:cs typeface="Arial" panose="020B0604020202020204" pitchFamily="34" charset="0"/>
-              </a:rPr>
-              <a:t>e</a:t>
-            </a:r>
-            <a:r>
-              <a:rPr lang="zh-TW" altLang="en-US" sz="1600" dirty="0">
-                <a:latin typeface="Arial" panose="020B0604020202020204" pitchFamily="34" charset="0"/>
-                <a:cs typeface="Arial" panose="020B0604020202020204" pitchFamily="34" charset="0"/>
-              </a:rPr>
-              <a:t> </a:t>
-            </a:r>
-            <a:r>
-              <a:rPr lang="en-US" altLang="zh-TW" sz="1600" dirty="0">
-                <a:latin typeface="Arial" panose="020B0604020202020204" pitchFamily="34" charset="0"/>
-                <a:cs typeface="Arial" panose="020B0604020202020204" pitchFamily="34" charset="0"/>
-              </a:rPr>
-              <a:t>the</a:t>
-            </a:r>
-            <a:r>
-              <a:rPr lang="zh-TW" altLang="en-US" sz="1600" dirty="0">
-                <a:latin typeface="Arial" panose="020B0604020202020204" pitchFamily="34" charset="0"/>
-                <a:cs typeface="Arial" panose="020B0604020202020204" pitchFamily="34" charset="0"/>
-              </a:rPr>
-              <a:t> </a:t>
-            </a:r>
-            <a:r>
-              <a:rPr lang="en-US" altLang="zh-TW" sz="1600" dirty="0">
-                <a:latin typeface="Arial" panose="020B0604020202020204" pitchFamily="34" charset="0"/>
-                <a:cs typeface="Arial" panose="020B0604020202020204" pitchFamily="34" charset="0"/>
-              </a:rPr>
-              <a:t>price</a:t>
-            </a:r>
-            <a:r>
-              <a:rPr lang="zh-TW" altLang="en-US" sz="1600" dirty="0">
-                <a:latin typeface="Arial" panose="020B0604020202020204" pitchFamily="34" charset="0"/>
-                <a:cs typeface="Arial" panose="020B0604020202020204" pitchFamily="34" charset="0"/>
-              </a:rPr>
-              <a:t> </a:t>
-            </a:r>
-            <a:r>
-              <a:rPr lang="en-US" altLang="zh-TW" sz="1600" dirty="0">
-                <a:latin typeface="Arial" panose="020B0604020202020204" pitchFamily="34" charset="0"/>
-                <a:cs typeface="Arial" panose="020B0604020202020204" pitchFamily="34" charset="0"/>
-              </a:rPr>
-              <a:t>over</a:t>
-            </a:r>
-            <a:r>
-              <a:rPr lang="zh-TW" altLang="en-US" sz="1600" dirty="0">
-                <a:latin typeface="Arial" panose="020B0604020202020204" pitchFamily="34" charset="0"/>
-                <a:cs typeface="Arial" panose="020B0604020202020204" pitchFamily="34" charset="0"/>
-              </a:rPr>
-              <a:t> </a:t>
-            </a:r>
-            <a:r>
-              <a:rPr lang="en-US" altLang="zh-TW" sz="1600" dirty="0">
-                <a:latin typeface="Arial" panose="020B0604020202020204" pitchFamily="34" charset="0"/>
-                <a:cs typeface="Arial" panose="020B0604020202020204" pitchFamily="34" charset="0"/>
-              </a:rPr>
-              <a:t>1.5</a:t>
-            </a:r>
-            <a:r>
-              <a:rPr lang="zh-TW" altLang="en-US" sz="1600" dirty="0">
-                <a:latin typeface="Arial" panose="020B0604020202020204" pitchFamily="34" charset="0"/>
-                <a:cs typeface="Arial" panose="020B0604020202020204" pitchFamily="34" charset="0"/>
-              </a:rPr>
-              <a:t>* </a:t>
-            </a:r>
-            <a:r>
-              <a:rPr lang="en-US" altLang="zh-TW" sz="1600" dirty="0">
-                <a:latin typeface="Arial" panose="020B0604020202020204" pitchFamily="34" charset="0"/>
-                <a:cs typeface="Arial" panose="020B0604020202020204" pitchFamily="34" charset="0"/>
-              </a:rPr>
-              <a:t>IQR</a:t>
-            </a:r>
-            <a:r>
-              <a:rPr lang="zh-TW" altLang="en-US" sz="1600" dirty="0">
-                <a:latin typeface="Arial" panose="020B0604020202020204" pitchFamily="34" charset="0"/>
-                <a:cs typeface="Arial" panose="020B0604020202020204" pitchFamily="34" charset="0"/>
-              </a:rPr>
-              <a:t> </a:t>
-            </a:r>
-            <a:r>
-              <a:rPr lang="en-US" altLang="zh-TW" sz="1600" dirty="0">
-                <a:latin typeface="Arial" panose="020B0604020202020204" pitchFamily="34" charset="0"/>
-                <a:cs typeface="Arial" panose="020B0604020202020204" pitchFamily="34" charset="0"/>
-              </a:rPr>
-              <a:t>as</a:t>
-            </a:r>
-            <a:r>
-              <a:rPr lang="zh-TW" altLang="en-US" sz="1600" dirty="0">
-                <a:latin typeface="Arial" panose="020B0604020202020204" pitchFamily="34" charset="0"/>
-                <a:cs typeface="Arial" panose="020B0604020202020204" pitchFamily="34" charset="0"/>
-              </a:rPr>
-              <a:t> </a:t>
-            </a:r>
-            <a:r>
-              <a:rPr lang="en-US" altLang="zh-TW" sz="1600" dirty="0">
-                <a:latin typeface="Arial" panose="020B0604020202020204" pitchFamily="34" charset="0"/>
-                <a:cs typeface="Arial" panose="020B0604020202020204" pitchFamily="34" charset="0"/>
-              </a:rPr>
-              <a:t>outliers</a:t>
-            </a:r>
-          </a:p>
-          <a:p>
-            <a:pPr lvl="1">
-              <a:lnSpc>
-                <a:spcPct val="100000"/>
-              </a:lnSpc>
-            </a:pPr>
-            <a:r>
-              <a:rPr lang="en-US" altLang="zh-TW" sz="1600" dirty="0">
-                <a:latin typeface="Arial" panose="020B0604020202020204" pitchFamily="34" charset="0"/>
-                <a:cs typeface="Arial" panose="020B0604020202020204" pitchFamily="34" charset="0"/>
-              </a:rPr>
-              <a:t>Deal</a:t>
-            </a:r>
-            <a:r>
-              <a:rPr lang="zh-TW" altLang="en-US" sz="1600" dirty="0">
-                <a:latin typeface="Arial" panose="020B0604020202020204" pitchFamily="34" charset="0"/>
-                <a:cs typeface="Arial" panose="020B0604020202020204" pitchFamily="34" charset="0"/>
-              </a:rPr>
-              <a:t> </a:t>
-            </a:r>
-            <a:r>
-              <a:rPr lang="en-US" altLang="zh-TW" sz="1600" dirty="0">
-                <a:latin typeface="Arial" panose="020B0604020202020204" pitchFamily="34" charset="0"/>
-                <a:cs typeface="Arial" panose="020B0604020202020204" pitchFamily="34" charset="0"/>
-              </a:rPr>
-              <a:t>with</a:t>
-            </a:r>
-            <a:r>
-              <a:rPr lang="zh-TW" altLang="en-US" sz="1600" dirty="0">
-                <a:latin typeface="Arial" panose="020B0604020202020204" pitchFamily="34" charset="0"/>
-                <a:cs typeface="Arial" panose="020B0604020202020204" pitchFamily="34" charset="0"/>
-              </a:rPr>
-              <a:t> </a:t>
-            </a:r>
-            <a:r>
-              <a:rPr lang="en-US" altLang="zh-TW" sz="1600" dirty="0">
-                <a:latin typeface="Arial" panose="020B0604020202020204" pitchFamily="34" charset="0"/>
-                <a:cs typeface="Arial" panose="020B0604020202020204" pitchFamily="34" charset="0"/>
-              </a:rPr>
-              <a:t>outliers</a:t>
-            </a:r>
-          </a:p>
-          <a:p>
-            <a:pPr lvl="1">
-              <a:lnSpc>
-                <a:spcPct val="100000"/>
-              </a:lnSpc>
-            </a:pPr>
-            <a:endParaRPr lang="en-US" sz="1600" dirty="0">
-              <a:effectLst/>
+              <a:t>Convert various currency and weight units to USD per pound.</a:t>
+            </a:r>
+            <a:endParaRPr lang="en-US" altLang="zh-TW" sz="1600" dirty="0">
               <a:latin typeface="Arial" panose="020B0604020202020204" pitchFamily="34" charset="0"/>
               <a:cs typeface="Arial" panose="020B0604020202020204" pitchFamily="34" charset="0"/>
             </a:endParaRPr>
           </a:p>
           <a:p>
-            <a:pPr>
+            <a:pPr marL="457200" lvl="1" indent="0">
               <a:lnSpc>
                 <a:spcPct val="100000"/>
               </a:lnSpc>
+              <a:buNone/>
             </a:pPr>
-            <a:r>
-              <a:rPr lang="en-US" sz="1600" b="1" dirty="0">
-                <a:effectLst/>
-                <a:latin typeface="Arial" panose="020B0604020202020204" pitchFamily="34" charset="0"/>
-                <a:cs typeface="Arial" panose="020B0604020202020204" pitchFamily="34" charset="0"/>
-              </a:rPr>
-              <a:t>Feature Scaling </a:t>
-            </a:r>
-          </a:p>
-          <a:p>
-            <a:pPr lvl="1">
-              <a:lnSpc>
-                <a:spcPct val="100000"/>
-              </a:lnSpc>
-            </a:pPr>
-            <a:r>
-              <a:rPr lang="en-US" altLang="zh-TW" sz="1600" dirty="0">
-                <a:latin typeface="Arial" panose="020B0604020202020204" pitchFamily="34" charset="0"/>
-                <a:cs typeface="Arial" panose="020B0604020202020204" pitchFamily="34" charset="0"/>
-              </a:rPr>
-              <a:t>Normalization</a:t>
-            </a:r>
-            <a:r>
-              <a:rPr lang="zh-TW" altLang="en-US" sz="1600" dirty="0">
-                <a:latin typeface="Arial" panose="020B0604020202020204" pitchFamily="34" charset="0"/>
-                <a:cs typeface="Arial" panose="020B0604020202020204" pitchFamily="34" charset="0"/>
-              </a:rPr>
-              <a:t> </a:t>
-            </a:r>
-            <a:r>
-              <a:rPr lang="en-US" altLang="zh-TW" sz="1600" dirty="0">
-                <a:latin typeface="Arial" panose="020B0604020202020204" pitchFamily="34" charset="0"/>
-                <a:cs typeface="Arial" panose="020B0604020202020204" pitchFamily="34" charset="0"/>
-              </a:rPr>
-              <a:t>the</a:t>
-            </a:r>
-            <a:r>
-              <a:rPr lang="zh-TW" altLang="en-US" sz="1600" dirty="0">
-                <a:latin typeface="Arial" panose="020B0604020202020204" pitchFamily="34" charset="0"/>
-                <a:cs typeface="Arial" panose="020B0604020202020204" pitchFamily="34" charset="0"/>
-              </a:rPr>
-              <a:t> </a:t>
-            </a:r>
-            <a:r>
-              <a:rPr lang="en-US" altLang="zh-TW" sz="1600" dirty="0">
-                <a:latin typeface="Arial" panose="020B0604020202020204" pitchFamily="34" charset="0"/>
-                <a:cs typeface="Arial" panose="020B0604020202020204" pitchFamily="34" charset="0"/>
-              </a:rPr>
-              <a:t>features</a:t>
-            </a:r>
-            <a:r>
-              <a:rPr lang="zh-TW" altLang="en-US" sz="1600" dirty="0">
-                <a:latin typeface="Arial" panose="020B0604020202020204" pitchFamily="34" charset="0"/>
-                <a:cs typeface="Arial" panose="020B0604020202020204" pitchFamily="34" charset="0"/>
-              </a:rPr>
-              <a:t> </a:t>
-            </a:r>
-            <a:r>
-              <a:rPr lang="en-US" altLang="zh-TW" sz="1600" dirty="0">
-                <a:latin typeface="Arial" panose="020B0604020202020204" pitchFamily="34" charset="0"/>
-                <a:cs typeface="Arial" panose="020B0604020202020204" pitchFamily="34" charset="0"/>
-              </a:rPr>
-              <a:t>as</a:t>
-            </a:r>
-            <a:r>
-              <a:rPr lang="zh-TW" altLang="en-US" sz="1600" dirty="0">
-                <a:latin typeface="Arial" panose="020B0604020202020204" pitchFamily="34" charset="0"/>
-                <a:cs typeface="Arial" panose="020B0604020202020204" pitchFamily="34" charset="0"/>
-              </a:rPr>
-              <a:t> </a:t>
-            </a:r>
-            <a:r>
-              <a:rPr lang="en-US" altLang="zh-TW" sz="1600" dirty="0">
-                <a:latin typeface="Arial" panose="020B0604020202020204" pitchFamily="34" charset="0"/>
-                <a:cs typeface="Arial" panose="020B0604020202020204" pitchFamily="34" charset="0"/>
-              </a:rPr>
-              <a:t>Standard</a:t>
-            </a:r>
-            <a:r>
-              <a:rPr lang="zh-TW" altLang="en-US" sz="1600" dirty="0">
-                <a:latin typeface="Arial" panose="020B0604020202020204" pitchFamily="34" charset="0"/>
-                <a:cs typeface="Arial" panose="020B0604020202020204" pitchFamily="34" charset="0"/>
-              </a:rPr>
-              <a:t> </a:t>
-            </a:r>
-            <a:r>
-              <a:rPr lang="en-US" altLang="zh-TW" sz="1600" dirty="0">
-                <a:latin typeface="Arial" panose="020B0604020202020204" pitchFamily="34" charset="0"/>
-                <a:cs typeface="Arial" panose="020B0604020202020204" pitchFamily="34" charset="0"/>
-              </a:rPr>
-              <a:t>Scales</a:t>
-            </a:r>
-            <a:endParaRPr lang="en-US" sz="1600" dirty="0">
-              <a:effectLst/>
+            <a:endParaRPr lang="en-US" altLang="zh-TW" sz="1600" dirty="0">
               <a:latin typeface="Arial" panose="020B0604020202020204" pitchFamily="34" charset="0"/>
               <a:cs typeface="Arial" panose="020B0604020202020204" pitchFamily="34" charset="0"/>
             </a:endParaRPr>
-          </a:p>
-          <a:p>
-            <a:pPr>
-              <a:lnSpc>
-                <a:spcPct val="100000"/>
-              </a:lnSpc>
-            </a:pPr>
-            <a:endParaRPr lang="en-US" dirty="0"/>
           </a:p>
         </p:txBody>
       </p:sp>
@@ -18265,7 +19408,7 @@
             <p:ph idx="1"/>
             <p:extLst>
               <p:ext uri="{D42A27DB-BD31-4B8C-83A1-F6EECF244321}">
-                <p14:modId xmlns:p14="http://schemas.microsoft.com/office/powerpoint/2010/main" val="254423588"/>
+                <p14:modId xmlns:p14="http://schemas.microsoft.com/office/powerpoint/2010/main" val="303639457"/>
               </p:ext>
             </p:extLst>
           </p:nvPr>
@@ -18498,9 +19641,24 @@
                           <a:ea typeface="+mn-ea"/>
                           <a:cs typeface="Arial" panose="020B0604020202020204" pitchFamily="34" charset="0"/>
                         </a:rPr>
-                        <a:t> p-value &lt;0.05, indicating that the geographical source of coffee beans significantly affects quality ratings.</a:t>
+                        <a:t> </a:t>
+                      </a:r>
+                      <a:r>
+                        <a:rPr lang="en-US" dirty="0"/>
+                        <a:t>p-value &lt; 0.05, </a:t>
+                      </a:r>
+                      <a:r>
+                        <a:rPr lang="en-US" dirty="0">
+                          <a:highlight>
+                            <a:srgbClr val="FFFF00"/>
+                          </a:highlight>
+                        </a:rPr>
+                        <a:t>indicating that the region of coffee beans significantly affects the score.</a:t>
                       </a:r>
                       <a:endParaRPr lang="en-US" dirty="0">
+                        <a:highlight>
+                          <a:srgbClr val="FFFF00"/>
+                        </a:highlight>
                         <a:latin typeface="Arial" panose="020B0604020202020204" pitchFamily="34" charset="0"/>
                         <a:cs typeface="Arial" panose="020B0604020202020204" pitchFamily="34" charset="0"/>
                       </a:endParaRPr>
@@ -18670,42 +19828,21 @@
                     <a:lstStyle/>
                     <a:p>
                       <a:r>
-                        <a:rPr lang="en-US" sz="1800" b="0" i="0" kern="1200" dirty="0">
-                          <a:solidFill>
-                            <a:schemeClr val="dk1"/>
-                          </a:solidFill>
-                          <a:effectLst/>
-                          <a:latin typeface="Arial" panose="020B0604020202020204" pitchFamily="34" charset="0"/>
-                          <a:ea typeface="+mn-ea"/>
-                          <a:cs typeface="Arial" panose="020B0604020202020204" pitchFamily="34" charset="0"/>
-                        </a:rPr>
-                        <a:t> p-value &lt;0.05, which means the analysis showed significant differences in coffee scores across </a:t>
+                        <a:rPr lang="en-US" dirty="0"/>
+                        <a:t>p-value &lt; 0.05, meaning the analysis showed significant differences in coffee scores depending on whether the coffee is blended or not. </a:t>
                       </a:r>
                       <a:r>
-                        <a:rPr lang="en-US" sz="1800" b="0" i="0" kern="1200" dirty="0" err="1">
-                          <a:solidFill>
-                            <a:schemeClr val="dk1"/>
-                          </a:solidFill>
-                          <a:effectLst/>
-                          <a:latin typeface="Arial" panose="020B0604020202020204" pitchFamily="34" charset="0"/>
-                          <a:ea typeface="+mn-ea"/>
-                          <a:cs typeface="Arial" panose="020B0604020202020204" pitchFamily="34" charset="0"/>
+                        <a:rPr lang="en-US" dirty="0">
+                          <a:highlight>
+                            <a:srgbClr val="FFFF00"/>
+                          </a:highlight>
                         </a:rPr>
-                        <a:t>is_blend</a:t>
-                      </a:r>
-                      <a:r>
-                        <a:rPr lang="en-US" sz="1800" b="0" i="0" kern="1200" dirty="0">
-                          <a:solidFill>
-                            <a:schemeClr val="dk1"/>
-                          </a:solidFill>
-                          <a:effectLst/>
-                          <a:latin typeface="Arial" panose="020B0604020202020204" pitchFamily="34" charset="0"/>
-                          <a:ea typeface="+mn-ea"/>
-                          <a:cs typeface="Arial" panose="020B0604020202020204" pitchFamily="34" charset="0"/>
-                        </a:rPr>
-                        <a:t> or not, indicating if blending coffee beans is significantly affects quality ratings.</a:t>
+                        <a:t>This indicates that blending coffee beans significantly affects the scores.</a:t>
                       </a:r>
                       <a:endParaRPr lang="en-US" dirty="0">
+                        <a:highlight>
+                          <a:srgbClr val="FFFF00"/>
+                        </a:highlight>
                         <a:latin typeface="Arial" panose="020B0604020202020204" pitchFamily="34" charset="0"/>
                         <a:cs typeface="Arial" panose="020B0604020202020204" pitchFamily="34" charset="0"/>
                       </a:endParaRPr>
@@ -19292,12 +20429,6 @@
                         </a:rPr>
                         <a:t>Dark roast coffees showed significantly lower scores compared to medium roasts</a:t>
                       </a:r>
-                    </a:p>
-                    <a:p>
-                      <a:endParaRPr lang="en-US" dirty="0">
-                        <a:latin typeface="Arial" panose="020B0604020202020204" pitchFamily="34" charset="0"/>
-                        <a:cs typeface="Arial" panose="020B0604020202020204" pitchFamily="34" charset="0"/>
-                      </a:endParaRPr>
                     </a:p>
                   </a:txBody>
                   <a:tcPr/>

</xml_diff>